<commit_message>
NuGet v1.0.5, DedupelibraryXL enhancements
</commit_message>
<xml_diff>
--- a/assets/diagram.pptx
+++ b/assets/diagram.pptx
@@ -104,6 +104,11 @@
       </a:defRPr>
     </a:lvl9pPr>
   </p:defaultTextStyle>
+  <p:extLst>
+    <p:ext uri="{EFAFB233-063F-42B5-8137-9DF3F51BA10A}">
+      <p15:sldGuideLst xmlns:p15="http://schemas.microsoft.com/office/powerpoint/2012/main"/>
+    </p:ext>
+  </p:extLst>
 </p:presentation>
 </file>
 
@@ -152,7 +157,6 @@
               <a:rPr lang="en-US"/>
               <a:t>Click to edit Master title style</a:t>
             </a:r>
-            <a:endParaRPr lang="en-US"/>
           </a:p>
         </p:txBody>
       </p:sp>
@@ -217,7 +221,6 @@
               <a:rPr lang="en-US"/>
               <a:t>Click to edit Master subtitle style</a:t>
             </a:r>
-            <a:endParaRPr lang="en-US"/>
           </a:p>
         </p:txBody>
       </p:sp>
@@ -238,7 +241,7 @@
           <a:p>
             <a:fld id="{674029AA-DF66-4633-A86F-E8C958DC830D}" type="datetimeFigureOut">
               <a:rPr lang="en-US" smtClean="0"/>
-              <a:t>2/9/2017</a:t>
+              <a:t>2/10/2017</a:t>
             </a:fld>
             <a:endParaRPr lang="en-US"/>
           </a:p>
@@ -335,7 +338,6 @@
               <a:rPr lang="en-US"/>
               <a:t>Click to edit Master title style</a:t>
             </a:r>
-            <a:endParaRPr lang="en-US"/>
           </a:p>
         </p:txBody>
       </p:sp>
@@ -387,7 +389,6 @@
               <a:rPr lang="en-US"/>
               <a:t>Fifth level</a:t>
             </a:r>
-            <a:endParaRPr lang="en-US"/>
           </a:p>
         </p:txBody>
       </p:sp>
@@ -408,7 +409,7 @@
           <a:p>
             <a:fld id="{674029AA-DF66-4633-A86F-E8C958DC830D}" type="datetimeFigureOut">
               <a:rPr lang="en-US" smtClean="0"/>
-              <a:t>2/9/2017</a:t>
+              <a:t>2/10/2017</a:t>
             </a:fld>
             <a:endParaRPr lang="en-US"/>
           </a:p>
@@ -510,7 +511,6 @@
               <a:rPr lang="en-US"/>
               <a:t>Click to edit Master title style</a:t>
             </a:r>
-            <a:endParaRPr lang="en-US"/>
           </a:p>
         </p:txBody>
       </p:sp>
@@ -567,7 +567,6 @@
               <a:rPr lang="en-US"/>
               <a:t>Fifth level</a:t>
             </a:r>
-            <a:endParaRPr lang="en-US"/>
           </a:p>
         </p:txBody>
       </p:sp>
@@ -588,7 +587,7 @@
           <a:p>
             <a:fld id="{674029AA-DF66-4633-A86F-E8C958DC830D}" type="datetimeFigureOut">
               <a:rPr lang="en-US" smtClean="0"/>
-              <a:t>2/9/2017</a:t>
+              <a:t>2/10/2017</a:t>
             </a:fld>
             <a:endParaRPr lang="en-US"/>
           </a:p>
@@ -685,7 +684,6 @@
               <a:rPr lang="en-US"/>
               <a:t>Click to edit Master title style</a:t>
             </a:r>
-            <a:endParaRPr lang="en-US"/>
           </a:p>
         </p:txBody>
       </p:sp>
@@ -737,7 +735,6 @@
               <a:rPr lang="en-US"/>
               <a:t>Fifth level</a:t>
             </a:r>
-            <a:endParaRPr lang="en-US"/>
           </a:p>
         </p:txBody>
       </p:sp>
@@ -758,7 +755,7 @@
           <a:p>
             <a:fld id="{674029AA-DF66-4633-A86F-E8C958DC830D}" type="datetimeFigureOut">
               <a:rPr lang="en-US" smtClean="0"/>
-              <a:t>2/9/2017</a:t>
+              <a:t>2/10/2017</a:t>
             </a:fld>
             <a:endParaRPr lang="en-US"/>
           </a:p>
@@ -864,7 +861,6 @@
               <a:rPr lang="en-US"/>
               <a:t>Click to edit Master title style</a:t>
             </a:r>
-            <a:endParaRPr lang="en-US"/>
           </a:p>
         </p:txBody>
       </p:sp>
@@ -1004,7 +1000,7 @@
           <a:p>
             <a:fld id="{674029AA-DF66-4633-A86F-E8C958DC830D}" type="datetimeFigureOut">
               <a:rPr lang="en-US" smtClean="0"/>
-              <a:t>2/9/2017</a:t>
+              <a:t>2/10/2017</a:t>
             </a:fld>
             <a:endParaRPr lang="en-US"/>
           </a:p>
@@ -1101,7 +1097,6 @@
               <a:rPr lang="en-US"/>
               <a:t>Click to edit Master title style</a:t>
             </a:r>
-            <a:endParaRPr lang="en-US"/>
           </a:p>
         </p:txBody>
       </p:sp>
@@ -1158,7 +1153,6 @@
               <a:rPr lang="en-US"/>
               <a:t>Fifth level</a:t>
             </a:r>
-            <a:endParaRPr lang="en-US"/>
           </a:p>
         </p:txBody>
       </p:sp>
@@ -1215,7 +1209,6 @@
               <a:rPr lang="en-US"/>
               <a:t>Fifth level</a:t>
             </a:r>
-            <a:endParaRPr lang="en-US"/>
           </a:p>
         </p:txBody>
       </p:sp>
@@ -1236,7 +1229,7 @@
           <a:p>
             <a:fld id="{674029AA-DF66-4633-A86F-E8C958DC830D}" type="datetimeFigureOut">
               <a:rPr lang="en-US" smtClean="0"/>
-              <a:t>2/9/2017</a:t>
+              <a:t>2/10/2017</a:t>
             </a:fld>
             <a:endParaRPr lang="en-US"/>
           </a:p>
@@ -1338,7 +1331,6 @@
               <a:rPr lang="en-US"/>
               <a:t>Click to edit Master title style</a:t>
             </a:r>
-            <a:endParaRPr lang="en-US"/>
           </a:p>
         </p:txBody>
       </p:sp>
@@ -1460,7 +1452,6 @@
               <a:rPr lang="en-US"/>
               <a:t>Fifth level</a:t>
             </a:r>
-            <a:endParaRPr lang="en-US"/>
           </a:p>
         </p:txBody>
       </p:sp>
@@ -1582,7 +1573,6 @@
               <a:rPr lang="en-US"/>
               <a:t>Fifth level</a:t>
             </a:r>
-            <a:endParaRPr lang="en-US"/>
           </a:p>
         </p:txBody>
       </p:sp>
@@ -1603,7 +1593,7 @@
           <a:p>
             <a:fld id="{674029AA-DF66-4633-A86F-E8C958DC830D}" type="datetimeFigureOut">
               <a:rPr lang="en-US" smtClean="0"/>
-              <a:t>2/9/2017</a:t>
+              <a:t>2/10/2017</a:t>
             </a:fld>
             <a:endParaRPr lang="en-US"/>
           </a:p>
@@ -1700,7 +1690,6 @@
               <a:rPr lang="en-US"/>
               <a:t>Click to edit Master title style</a:t>
             </a:r>
-            <a:endParaRPr lang="en-US"/>
           </a:p>
         </p:txBody>
       </p:sp>
@@ -1721,7 +1710,7 @@
           <a:p>
             <a:fld id="{674029AA-DF66-4633-A86F-E8C958DC830D}" type="datetimeFigureOut">
               <a:rPr lang="en-US" smtClean="0"/>
-              <a:t>2/9/2017</a:t>
+              <a:t>2/10/2017</a:t>
             </a:fld>
             <a:endParaRPr lang="en-US"/>
           </a:p>
@@ -1816,7 +1805,7 @@
           <a:p>
             <a:fld id="{674029AA-DF66-4633-A86F-E8C958DC830D}" type="datetimeFigureOut">
               <a:rPr lang="en-US" smtClean="0"/>
-              <a:t>2/9/2017</a:t>
+              <a:t>2/10/2017</a:t>
             </a:fld>
             <a:endParaRPr lang="en-US"/>
           </a:p>
@@ -1922,7 +1911,6 @@
               <a:rPr lang="en-US"/>
               <a:t>Click to edit Master title style</a:t>
             </a:r>
-            <a:endParaRPr lang="en-US"/>
           </a:p>
         </p:txBody>
       </p:sp>
@@ -2007,7 +1995,6 @@
               <a:rPr lang="en-US"/>
               <a:t>Fifth level</a:t>
             </a:r>
-            <a:endParaRPr lang="en-US"/>
           </a:p>
         </p:txBody>
       </p:sp>
@@ -2093,7 +2080,7 @@
           <a:p>
             <a:fld id="{674029AA-DF66-4633-A86F-E8C958DC830D}" type="datetimeFigureOut">
               <a:rPr lang="en-US" smtClean="0"/>
-              <a:t>2/9/2017</a:t>
+              <a:t>2/10/2017</a:t>
             </a:fld>
             <a:endParaRPr lang="en-US"/>
           </a:p>
@@ -2199,7 +2186,6 @@
               <a:rPr lang="en-US"/>
               <a:t>Click to edit Master title style</a:t>
             </a:r>
-            <a:endParaRPr lang="en-US"/>
           </a:p>
         </p:txBody>
       </p:sp>
@@ -2346,7 +2332,7 @@
           <a:p>
             <a:fld id="{674029AA-DF66-4633-A86F-E8C958DC830D}" type="datetimeFigureOut">
               <a:rPr lang="en-US" smtClean="0"/>
-              <a:t>2/9/2017</a:t>
+              <a:t>2/10/2017</a:t>
             </a:fld>
             <a:endParaRPr lang="en-US"/>
           </a:p>
@@ -2458,7 +2444,6 @@
               <a:rPr lang="en-US"/>
               <a:t>Click to edit Master title style</a:t>
             </a:r>
-            <a:endParaRPr lang="en-US"/>
           </a:p>
         </p:txBody>
       </p:sp>
@@ -2520,7 +2505,6 @@
               <a:rPr lang="en-US"/>
               <a:t>Fifth level</a:t>
             </a:r>
-            <a:endParaRPr lang="en-US"/>
           </a:p>
         </p:txBody>
       </p:sp>
@@ -2559,7 +2543,7 @@
           <a:p>
             <a:fld id="{674029AA-DF66-4633-A86F-E8C958DC830D}" type="datetimeFigureOut">
               <a:rPr lang="en-US" smtClean="0"/>
-              <a:t>2/9/2017</a:t>
+              <a:t>2/10/2017</a:t>
             </a:fld>
             <a:endParaRPr lang="en-US"/>
           </a:p>
@@ -2964,6 +2948,86 @@
           <a:chExt cx="0" cy="0"/>
         </a:xfrm>
       </p:grpSpPr>
+      <p:sp>
+        <p:nvSpPr>
+          <p:cNvPr id="28" name="Arrow: Right 27"/>
+          <p:cNvSpPr/>
+          <p:nvPr/>
+        </p:nvSpPr>
+        <p:spPr>
+          <a:xfrm>
+            <a:off x="2341835" y="3478586"/>
+            <a:ext cx="581849" cy="446379"/>
+          </a:xfrm>
+          <a:prstGeom prst="rightArrow">
+            <a:avLst/>
+          </a:prstGeom>
+        </p:spPr>
+        <p:style>
+          <a:lnRef idx="2">
+            <a:schemeClr val="accent1">
+              <a:shade val="50000"/>
+            </a:schemeClr>
+          </a:lnRef>
+          <a:fillRef idx="1">
+            <a:schemeClr val="accent1"/>
+          </a:fillRef>
+          <a:effectRef idx="0">
+            <a:schemeClr val="accent1"/>
+          </a:effectRef>
+          <a:fontRef idx="minor">
+            <a:schemeClr val="lt1"/>
+          </a:fontRef>
+        </p:style>
+        <p:txBody>
+          <a:bodyPr rtlCol="0" anchor="ctr"/>
+          <a:lstStyle/>
+          <a:p>
+            <a:pPr algn="ctr"/>
+            <a:endParaRPr lang="en-US" sz="1200"/>
+          </a:p>
+        </p:txBody>
+      </p:sp>
+      <p:sp>
+        <p:nvSpPr>
+          <p:cNvPr id="50" name="Arrow: Right 49"/>
+          <p:cNvSpPr/>
+          <p:nvPr/>
+        </p:nvSpPr>
+        <p:spPr>
+          <a:xfrm>
+            <a:off x="5710530" y="3407394"/>
+            <a:ext cx="2682421" cy="446379"/>
+          </a:xfrm>
+          <a:prstGeom prst="rightArrow">
+            <a:avLst/>
+          </a:prstGeom>
+        </p:spPr>
+        <p:style>
+          <a:lnRef idx="2">
+            <a:schemeClr val="accent1">
+              <a:shade val="50000"/>
+            </a:schemeClr>
+          </a:lnRef>
+          <a:fillRef idx="1">
+            <a:schemeClr val="accent1"/>
+          </a:fillRef>
+          <a:effectRef idx="0">
+            <a:schemeClr val="accent1"/>
+          </a:effectRef>
+          <a:fontRef idx="minor">
+            <a:schemeClr val="lt1"/>
+          </a:fontRef>
+        </p:style>
+        <p:txBody>
+          <a:bodyPr rtlCol="0" anchor="ctr"/>
+          <a:lstStyle/>
+          <a:p>
+            <a:pPr algn="ctr"/>
+            <a:endParaRPr lang="en-US" sz="1200"/>
+          </a:p>
+        </p:txBody>
+      </p:sp>
       <p:pic>
         <p:nvPicPr>
           <p:cNvPr id="4" name="Picture 3"/>
@@ -2986,8 +3050,8 @@
         </p:blipFill>
         <p:spPr>
           <a:xfrm>
-            <a:off x="4449972" y="2009416"/>
-            <a:ext cx="2665562" cy="2665562"/>
+            <a:off x="1109924" y="1901659"/>
+            <a:ext cx="1729376" cy="1546890"/>
           </a:xfrm>
           <a:prstGeom prst="rect">
             <a:avLst/>
@@ -3016,8 +3080,8 @@
         </p:blipFill>
         <p:spPr>
           <a:xfrm>
-            <a:off x="4915480" y="4174643"/>
-            <a:ext cx="1781674" cy="1781674"/>
+            <a:off x="1411938" y="3158193"/>
+            <a:ext cx="1155923" cy="1033948"/>
           </a:xfrm>
           <a:prstGeom prst="rect">
             <a:avLst/>
@@ -3046,8 +3110,8 @@
         </p:blipFill>
         <p:spPr>
           <a:xfrm>
-            <a:off x="4956055" y="766725"/>
-            <a:ext cx="785004" cy="785004"/>
+            <a:off x="1438262" y="1180496"/>
+            <a:ext cx="509299" cy="455557"/>
           </a:xfrm>
           <a:prstGeom prst="rect">
             <a:avLst/>
@@ -3076,8 +3140,8 @@
         </p:blipFill>
         <p:spPr>
           <a:xfrm>
-            <a:off x="6330530" y="766725"/>
-            <a:ext cx="785004" cy="785004"/>
+            <a:off x="2330001" y="1180496"/>
+            <a:ext cx="509299" cy="455557"/>
           </a:xfrm>
           <a:prstGeom prst="rect">
             <a:avLst/>
@@ -3106,8 +3170,8 @@
         </p:blipFill>
         <p:spPr>
           <a:xfrm>
-            <a:off x="4957172" y="3087225"/>
-            <a:ext cx="500822" cy="500822"/>
+            <a:off x="1438987" y="2527138"/>
+            <a:ext cx="324926" cy="290639"/>
           </a:xfrm>
           <a:prstGeom prst="rect">
             <a:avLst/>
@@ -3136,8 +3200,8 @@
         </p:blipFill>
         <p:spPr>
           <a:xfrm>
-            <a:off x="5533778" y="3087225"/>
-            <a:ext cx="500822" cy="500822"/>
+            <a:off x="1813080" y="2527138"/>
+            <a:ext cx="324926" cy="290639"/>
           </a:xfrm>
           <a:prstGeom prst="rect">
             <a:avLst/>
@@ -3166,8 +3230,8 @@
         </p:blipFill>
         <p:spPr>
           <a:xfrm>
-            <a:off x="6123249" y="3087225"/>
-            <a:ext cx="500822" cy="500822"/>
+            <a:off x="2195520" y="2527138"/>
+            <a:ext cx="324926" cy="290639"/>
           </a:xfrm>
           <a:prstGeom prst="rect">
             <a:avLst/>
@@ -3196,8 +3260,8 @@
         </p:blipFill>
         <p:spPr>
           <a:xfrm>
-            <a:off x="4260191" y="766725"/>
-            <a:ext cx="785004" cy="785004"/>
+            <a:off x="986796" y="1180496"/>
+            <a:ext cx="509299" cy="455557"/>
           </a:xfrm>
           <a:prstGeom prst="rect">
             <a:avLst/>
@@ -3212,8 +3276,8 @@
         </p:nvSpPr>
         <p:spPr>
           <a:xfrm>
-            <a:off x="4646942" y="1517710"/>
-            <a:ext cx="517585" cy="1604513"/>
+            <a:off x="1237715" y="1616311"/>
+            <a:ext cx="335801" cy="931137"/>
           </a:xfrm>
           <a:custGeom>
             <a:avLst/>
@@ -3295,7 +3359,7 @@
           <a:lstStyle/>
           <a:p>
             <a:pPr algn="ctr"/>
-            <a:endParaRPr lang="en-US"/>
+            <a:endParaRPr lang="en-US" sz="1200"/>
           </a:p>
         </p:txBody>
       </p:sp>
@@ -3307,8 +3371,8 @@
         </p:nvSpPr>
         <p:spPr>
           <a:xfrm flipH="1">
-            <a:off x="6398823" y="1521778"/>
-            <a:ext cx="313897" cy="1604513"/>
+            <a:off x="2374308" y="1618671"/>
+            <a:ext cx="203652" cy="931137"/>
           </a:xfrm>
           <a:custGeom>
             <a:avLst/>
@@ -3390,7 +3454,7 @@
           <a:lstStyle/>
           <a:p>
             <a:pPr algn="ctr"/>
-            <a:endParaRPr lang="en-US"/>
+            <a:endParaRPr lang="en-US" sz="1200"/>
           </a:p>
         </p:txBody>
       </p:sp>
@@ -3402,8 +3466,8 @@
         </p:nvSpPr>
         <p:spPr>
           <a:xfrm>
-            <a:off x="5387374" y="1517710"/>
-            <a:ext cx="303779" cy="1604513"/>
+            <a:off x="1718096" y="1616311"/>
+            <a:ext cx="197087" cy="931137"/>
           </a:xfrm>
           <a:custGeom>
             <a:avLst/>
@@ -3485,7 +3549,7 @@
           <a:lstStyle/>
           <a:p>
             <a:pPr algn="ctr"/>
-            <a:endParaRPr lang="en-US"/>
+            <a:endParaRPr lang="en-US" sz="1200"/>
           </a:p>
         </p:txBody>
       </p:sp>
@@ -3497,8 +3561,8 @@
         </p:nvSpPr>
         <p:spPr>
           <a:xfrm>
-            <a:off x="4748492" y="3510412"/>
-            <a:ext cx="286639" cy="724619"/>
+            <a:off x="1303599" y="2772724"/>
+            <a:ext cx="185967" cy="420514"/>
           </a:xfrm>
           <a:custGeom>
             <a:avLst/>
@@ -3575,7 +3639,7 @@
           <a:lstStyle/>
           <a:p>
             <a:pPr algn="ctr"/>
-            <a:endParaRPr lang="en-US"/>
+            <a:endParaRPr lang="en-US" sz="1200"/>
           </a:p>
         </p:txBody>
       </p:sp>
@@ -3587,8 +3651,8 @@
         </p:nvSpPr>
         <p:spPr>
           <a:xfrm>
-            <a:off x="4439728" y="3432774"/>
-            <a:ext cx="647161" cy="1966823"/>
+            <a:off x="1103277" y="2727668"/>
+            <a:ext cx="419868" cy="1141395"/>
           </a:xfrm>
           <a:custGeom>
             <a:avLst/>
@@ -3665,7 +3729,7 @@
           <a:lstStyle/>
           <a:p>
             <a:pPr algn="ctr"/>
-            <a:endParaRPr lang="en-US"/>
+            <a:endParaRPr lang="en-US" sz="1200"/>
           </a:p>
         </p:txBody>
       </p:sp>
@@ -3677,8 +3741,8 @@
         </p:nvSpPr>
         <p:spPr>
           <a:xfrm>
-            <a:off x="5293923" y="3562170"/>
-            <a:ext cx="424028" cy="1526875"/>
+            <a:off x="1657466" y="2802760"/>
+            <a:ext cx="275103" cy="886082"/>
           </a:xfrm>
           <a:custGeom>
             <a:avLst/>
@@ -3765,7 +3829,7 @@
           <a:lstStyle/>
           <a:p>
             <a:pPr algn="ctr"/>
-            <a:endParaRPr lang="en-US"/>
+            <a:endParaRPr lang="en-US" sz="1200"/>
           </a:p>
         </p:txBody>
       </p:sp>
@@ -3777,8 +3841,8 @@
         </p:nvSpPr>
         <p:spPr>
           <a:xfrm>
-            <a:off x="5371561" y="3536291"/>
-            <a:ext cx="1035170" cy="1190445"/>
+            <a:off x="1707836" y="2787742"/>
+            <a:ext cx="671603" cy="690844"/>
           </a:xfrm>
           <a:custGeom>
             <a:avLst/>
@@ -3855,7 +3919,7 @@
           <a:lstStyle/>
           <a:p>
             <a:pPr algn="ctr"/>
-            <a:endParaRPr lang="en-US"/>
+            <a:endParaRPr lang="en-US" sz="1200"/>
           </a:p>
         </p:txBody>
       </p:sp>
@@ -3881,8 +3945,8 @@
         </p:blipFill>
         <p:spPr>
           <a:xfrm>
-            <a:off x="7591286" y="4454745"/>
-            <a:ext cx="1268600" cy="1268600"/>
+            <a:off x="2923684" y="3320743"/>
+            <a:ext cx="823048" cy="736199"/>
           </a:xfrm>
           <a:prstGeom prst="rect">
             <a:avLst/>
@@ -3891,18 +3955,445 @@
       </p:pic>
       <p:sp>
         <p:nvSpPr>
-          <p:cNvPr id="28" name="Arrow: Right 27"/>
+          <p:cNvPr id="29" name="TextBox 28"/>
+          <p:cNvSpPr txBox="1"/>
+          <p:nvPr/>
+        </p:nvSpPr>
+        <p:spPr>
+          <a:xfrm>
+            <a:off x="2849618" y="1288306"/>
+            <a:ext cx="1093803" cy="276999"/>
+          </a:xfrm>
+          <a:prstGeom prst="rect">
+            <a:avLst/>
+          </a:prstGeom>
+          <a:noFill/>
+        </p:spPr>
+        <p:txBody>
+          <a:bodyPr wrap="square" rtlCol="0">
+            <a:spAutoFit/>
+          </a:bodyPr>
+          <a:lstStyle/>
+          <a:p>
+            <a:r>
+              <a:rPr lang="en-US" sz="1200" dirty="0"/>
+              <a:t>Objects</a:t>
+            </a:r>
+          </a:p>
+        </p:txBody>
+      </p:sp>
+      <p:sp>
+        <p:nvSpPr>
+          <p:cNvPr id="33" name="TextBox 32"/>
+          <p:cNvSpPr txBox="1"/>
+          <p:nvPr/>
+        </p:nvSpPr>
+        <p:spPr>
+          <a:xfrm>
+            <a:off x="2849618" y="2440282"/>
+            <a:ext cx="1093803" cy="276999"/>
+          </a:xfrm>
+          <a:prstGeom prst="rect">
+            <a:avLst/>
+          </a:prstGeom>
+          <a:noFill/>
+        </p:spPr>
+        <p:txBody>
+          <a:bodyPr wrap="square" rtlCol="0">
+            <a:spAutoFit/>
+          </a:bodyPr>
+          <a:lstStyle/>
+          <a:p>
+            <a:r>
+              <a:rPr lang="en-US" sz="1200" dirty="0"/>
+              <a:t>Index</a:t>
+            </a:r>
+          </a:p>
+        </p:txBody>
+      </p:sp>
+      <p:sp>
+        <p:nvSpPr>
+          <p:cNvPr id="34" name="TextBox 33"/>
+          <p:cNvSpPr txBox="1"/>
+          <p:nvPr/>
+        </p:nvSpPr>
+        <p:spPr>
+          <a:xfrm>
+            <a:off x="2985572" y="3554218"/>
+            <a:ext cx="642686" cy="461665"/>
+          </a:xfrm>
+          <a:prstGeom prst="rect">
+            <a:avLst/>
+          </a:prstGeom>
+          <a:noFill/>
+        </p:spPr>
+        <p:txBody>
+          <a:bodyPr wrap="square" rtlCol="0">
+            <a:spAutoFit/>
+          </a:bodyPr>
+          <a:lstStyle/>
+          <a:p>
+            <a:pPr algn="ctr"/>
+            <a:r>
+              <a:rPr lang="en-US" sz="1200" dirty="0"/>
+              <a:t>Chunk</a:t>
+            </a:r>
+            <a:br>
+              <a:rPr lang="en-US" sz="1200" dirty="0"/>
+            </a:br>
+            <a:r>
+              <a:rPr lang="en-US" sz="1200" dirty="0"/>
+              <a:t>Folder</a:t>
+            </a:r>
+          </a:p>
+        </p:txBody>
+      </p:sp>
+      <p:sp>
+        <p:nvSpPr>
+          <p:cNvPr id="35" name="TextBox 34"/>
+          <p:cNvSpPr txBox="1"/>
+          <p:nvPr/>
+        </p:nvSpPr>
+        <p:spPr>
+          <a:xfrm>
+            <a:off x="738308" y="3715512"/>
+            <a:ext cx="642686" cy="461665"/>
+          </a:xfrm>
+          <a:prstGeom prst="rect">
+            <a:avLst/>
+          </a:prstGeom>
+          <a:noFill/>
+        </p:spPr>
+        <p:txBody>
+          <a:bodyPr wrap="square" rtlCol="0">
+            <a:spAutoFit/>
+          </a:bodyPr>
+          <a:lstStyle/>
+          <a:p>
+            <a:pPr algn="ctr"/>
+            <a:r>
+              <a:rPr lang="en-US" sz="1200" dirty="0"/>
+              <a:t>Chunk</a:t>
+            </a:r>
+            <a:br>
+              <a:rPr lang="en-US" sz="1200" dirty="0"/>
+            </a:br>
+            <a:r>
+              <a:rPr lang="en-US" sz="1200" dirty="0"/>
+              <a:t>Map</a:t>
+            </a:r>
+          </a:p>
+        </p:txBody>
+      </p:sp>
+      <p:pic>
+        <p:nvPicPr>
+          <p:cNvPr id="31" name="Picture 30"/>
+          <p:cNvPicPr>
+            <a:picLocks noChangeAspect="1"/>
+          </p:cNvPicPr>
+          <p:nvPr/>
+        </p:nvPicPr>
+        <p:blipFill>
+          <a:blip r:embed="rId2">
+            <a:extLst>
+              <a:ext uri="{28A0092B-C50C-407E-A947-70E740481C1C}">
+                <a14:useLocalDpi xmlns:a14="http://schemas.microsoft.com/office/drawing/2010/main" val="0"/>
+              </a:ext>
+            </a:extLst>
+          </a:blip>
+          <a:stretch>
+            <a:fillRect/>
+          </a:stretch>
+        </p:blipFill>
+        <p:spPr>
+          <a:xfrm>
+            <a:off x="4382398" y="2055583"/>
+            <a:ext cx="1301435" cy="1164106"/>
+          </a:xfrm>
+          <a:prstGeom prst="rect">
+            <a:avLst/>
+          </a:prstGeom>
+        </p:spPr>
+      </p:pic>
+      <p:pic>
+        <p:nvPicPr>
+          <p:cNvPr id="32" name="Picture 31"/>
+          <p:cNvPicPr>
+            <a:picLocks noChangeAspect="1"/>
+          </p:cNvPicPr>
+          <p:nvPr/>
+        </p:nvPicPr>
+        <p:blipFill>
+          <a:blip r:embed="rId3">
+            <a:extLst>
+              <a:ext uri="{28A0092B-C50C-407E-A947-70E740481C1C}">
+                <a14:useLocalDpi xmlns:a14="http://schemas.microsoft.com/office/drawing/2010/main" val="0"/>
+              </a:ext>
+            </a:extLst>
+          </a:blip>
+          <a:stretch>
+            <a:fillRect/>
+          </a:stretch>
+        </p:blipFill>
+        <p:spPr>
+          <a:xfrm>
+            <a:off x="4646637" y="3146025"/>
+            <a:ext cx="1155923" cy="1033948"/>
+          </a:xfrm>
+          <a:prstGeom prst="rect">
+            <a:avLst/>
+          </a:prstGeom>
+        </p:spPr>
+      </p:pic>
+      <p:pic>
+        <p:nvPicPr>
+          <p:cNvPr id="36" name="Picture 35"/>
+          <p:cNvPicPr>
+            <a:picLocks noChangeAspect="1"/>
+          </p:cNvPicPr>
+          <p:nvPr/>
+        </p:nvPicPr>
+        <p:blipFill>
+          <a:blip r:embed="rId4">
+            <a:extLst>
+              <a:ext uri="{28A0092B-C50C-407E-A947-70E740481C1C}">
+                <a14:useLocalDpi xmlns:a14="http://schemas.microsoft.com/office/drawing/2010/main" val="0"/>
+              </a:ext>
+            </a:extLst>
+          </a:blip>
+          <a:stretch>
+            <a:fillRect/>
+          </a:stretch>
+        </p:blipFill>
+        <p:spPr>
+          <a:xfrm>
+            <a:off x="4707465" y="1185580"/>
+            <a:ext cx="509299" cy="455557"/>
+          </a:xfrm>
+          <a:prstGeom prst="rect">
+            <a:avLst/>
+          </a:prstGeom>
+        </p:spPr>
+      </p:pic>
+      <p:pic>
+        <p:nvPicPr>
+          <p:cNvPr id="37" name="Picture 36"/>
+          <p:cNvPicPr>
+            <a:picLocks noChangeAspect="1"/>
+          </p:cNvPicPr>
+          <p:nvPr/>
+        </p:nvPicPr>
+        <p:blipFill>
+          <a:blip r:embed="rId4">
+            <a:extLst>
+              <a:ext uri="{28A0092B-C50C-407E-A947-70E740481C1C}">
+                <a14:useLocalDpi xmlns:a14="http://schemas.microsoft.com/office/drawing/2010/main" val="0"/>
+              </a:ext>
+            </a:extLst>
+          </a:blip>
+          <a:stretch>
+            <a:fillRect/>
+          </a:stretch>
+        </p:blipFill>
+        <p:spPr>
+          <a:xfrm>
+            <a:off x="6315199" y="1185580"/>
+            <a:ext cx="509299" cy="455557"/>
+          </a:xfrm>
+          <a:prstGeom prst="rect">
+            <a:avLst/>
+          </a:prstGeom>
+        </p:spPr>
+      </p:pic>
+      <p:pic>
+        <p:nvPicPr>
+          <p:cNvPr id="38" name="Picture 37"/>
+          <p:cNvPicPr>
+            <a:picLocks noChangeAspect="1"/>
+          </p:cNvPicPr>
+          <p:nvPr/>
+        </p:nvPicPr>
+        <p:blipFill>
+          <a:blip r:embed="rId4">
+            <a:extLst>
+              <a:ext uri="{28A0092B-C50C-407E-A947-70E740481C1C}">
+                <a14:useLocalDpi xmlns:a14="http://schemas.microsoft.com/office/drawing/2010/main" val="0"/>
+              </a:ext>
+            </a:extLst>
+          </a:blip>
+          <a:stretch>
+            <a:fillRect/>
+          </a:stretch>
+        </p:blipFill>
+        <p:spPr>
+          <a:xfrm>
+            <a:off x="4708190" y="2532222"/>
+            <a:ext cx="324926" cy="290639"/>
+          </a:xfrm>
+          <a:prstGeom prst="rect">
+            <a:avLst/>
+          </a:prstGeom>
+        </p:spPr>
+      </p:pic>
+      <p:pic>
+        <p:nvPicPr>
+          <p:cNvPr id="39" name="Picture 38"/>
+          <p:cNvPicPr>
+            <a:picLocks noChangeAspect="1"/>
+          </p:cNvPicPr>
+          <p:nvPr/>
+        </p:nvPicPr>
+        <p:blipFill>
+          <a:blip r:embed="rId4">
+            <a:extLst>
+              <a:ext uri="{28A0092B-C50C-407E-A947-70E740481C1C}">
+                <a14:useLocalDpi xmlns:a14="http://schemas.microsoft.com/office/drawing/2010/main" val="0"/>
+              </a:ext>
+            </a:extLst>
+          </a:blip>
+          <a:stretch>
+            <a:fillRect/>
+          </a:stretch>
+        </p:blipFill>
+        <p:spPr>
+          <a:xfrm>
+            <a:off x="5082283" y="2532222"/>
+            <a:ext cx="324926" cy="290639"/>
+          </a:xfrm>
+          <a:prstGeom prst="rect">
+            <a:avLst/>
+          </a:prstGeom>
+        </p:spPr>
+      </p:pic>
+      <p:pic>
+        <p:nvPicPr>
+          <p:cNvPr id="40" name="Picture 39"/>
+          <p:cNvPicPr>
+            <a:picLocks noChangeAspect="1"/>
+          </p:cNvPicPr>
+          <p:nvPr/>
+        </p:nvPicPr>
+        <p:blipFill>
+          <a:blip r:embed="rId4">
+            <a:extLst>
+              <a:ext uri="{28A0092B-C50C-407E-A947-70E740481C1C}">
+                <a14:useLocalDpi xmlns:a14="http://schemas.microsoft.com/office/drawing/2010/main" val="0"/>
+              </a:ext>
+            </a:extLst>
+          </a:blip>
+          <a:stretch>
+            <a:fillRect/>
+          </a:stretch>
+        </p:blipFill>
+        <p:spPr>
+          <a:xfrm>
+            <a:off x="6180718" y="2532222"/>
+            <a:ext cx="324926" cy="290639"/>
+          </a:xfrm>
+          <a:prstGeom prst="rect">
+            <a:avLst/>
+          </a:prstGeom>
+        </p:spPr>
+      </p:pic>
+      <p:pic>
+        <p:nvPicPr>
+          <p:cNvPr id="41" name="Picture 40"/>
+          <p:cNvPicPr>
+            <a:picLocks noChangeAspect="1"/>
+          </p:cNvPicPr>
+          <p:nvPr/>
+        </p:nvPicPr>
+        <p:blipFill>
+          <a:blip r:embed="rId4">
+            <a:extLst>
+              <a:ext uri="{28A0092B-C50C-407E-A947-70E740481C1C}">
+                <a14:useLocalDpi xmlns:a14="http://schemas.microsoft.com/office/drawing/2010/main" val="0"/>
+              </a:ext>
+            </a:extLst>
+          </a:blip>
+          <a:stretch>
+            <a:fillRect/>
+          </a:stretch>
+        </p:blipFill>
+        <p:spPr>
+          <a:xfrm>
+            <a:off x="4255999" y="1185580"/>
+            <a:ext cx="509299" cy="455557"/>
+          </a:xfrm>
+          <a:prstGeom prst="rect">
+            <a:avLst/>
+          </a:prstGeom>
+        </p:spPr>
+      </p:pic>
+      <p:sp>
+        <p:nvSpPr>
+          <p:cNvPr id="42" name="Freeform: Shape 41"/>
           <p:cNvSpPr/>
           <p:nvPr/>
         </p:nvSpPr>
         <p:spPr>
           <a:xfrm>
-            <a:off x="6694456" y="4726736"/>
-            <a:ext cx="896829" cy="769189"/>
-          </a:xfrm>
-          <a:prstGeom prst="rightArrow">
+            <a:off x="4506918" y="1621395"/>
+            <a:ext cx="335801" cy="931137"/>
+          </a:xfrm>
+          <a:custGeom>
             <a:avLst/>
-          </a:prstGeom>
+            <a:gdLst>
+              <a:gd name="connsiteX0" fmla="*/ 0 w 517585"/>
+              <a:gd name="connsiteY0" fmla="*/ 0 h 1604513"/>
+              <a:gd name="connsiteX1" fmla="*/ 232913 w 517585"/>
+              <a:gd name="connsiteY1" fmla="*/ 905773 h 1604513"/>
+              <a:gd name="connsiteX2" fmla="*/ 517585 w 517585"/>
+              <a:gd name="connsiteY2" fmla="*/ 1604513 h 1604513"/>
+            </a:gdLst>
+            <a:ahLst/>
+            <a:cxnLst>
+              <a:cxn ang="0">
+                <a:pos x="connsiteX0" y="connsiteY0"/>
+              </a:cxn>
+              <a:cxn ang="0">
+                <a:pos x="connsiteX1" y="connsiteY1"/>
+              </a:cxn>
+              <a:cxn ang="0">
+                <a:pos x="connsiteX2" y="connsiteY2"/>
+              </a:cxn>
+            </a:cxnLst>
+            <a:rect l="l" t="t" r="r" b="b"/>
+            <a:pathLst>
+              <a:path w="517585" h="1604513">
+                <a:moveTo>
+                  <a:pt x="0" y="0"/>
+                </a:moveTo>
+                <a:cubicBezTo>
+                  <a:pt x="73324" y="319177"/>
+                  <a:pt x="146649" y="638354"/>
+                  <a:pt x="232913" y="905773"/>
+                </a:cubicBezTo>
+                <a:cubicBezTo>
+                  <a:pt x="319177" y="1173192"/>
+                  <a:pt x="418381" y="1388852"/>
+                  <a:pt x="517585" y="1604513"/>
+                </a:cubicBezTo>
+              </a:path>
+            </a:pathLst>
+          </a:custGeom>
+          <a:noFill/>
+          <a:ln w="76200">
+            <a:solidFill>
+              <a:schemeClr val="accent6">
+                <a:lumMod val="75000"/>
+              </a:schemeClr>
+            </a:solidFill>
+            <a:headEnd type="none" w="med" len="med"/>
+            <a:tailEnd type="triangle" w="med" len="med"/>
+          </a:ln>
+          <a:effectLst>
+            <a:outerShdw blurRad="50800" dist="38100" dir="2700000" algn="tl" rotWithShape="0">
+              <a:prstClr val="black">
+                <a:alpha val="40000"/>
+              </a:prstClr>
+            </a:outerShdw>
+          </a:effectLst>
         </p:spPr>
         <p:style>
           <a:lnRef idx="2">
@@ -3925,20 +4416,515 @@
           <a:lstStyle/>
           <a:p>
             <a:pPr algn="ctr"/>
-            <a:endParaRPr lang="en-US"/>
-          </a:p>
-        </p:txBody>
-      </p:sp>
-      <p:sp>
-        <p:nvSpPr>
-          <p:cNvPr id="29" name="TextBox 28"/>
+            <a:endParaRPr lang="en-US" sz="1200"/>
+          </a:p>
+        </p:txBody>
+      </p:sp>
+      <p:sp>
+        <p:nvSpPr>
+          <p:cNvPr id="44" name="Freeform: Shape 43"/>
+          <p:cNvSpPr/>
+          <p:nvPr/>
+        </p:nvSpPr>
+        <p:spPr>
+          <a:xfrm>
+            <a:off x="4987299" y="1621395"/>
+            <a:ext cx="197087" cy="931137"/>
+          </a:xfrm>
+          <a:custGeom>
+            <a:avLst/>
+            <a:gdLst>
+              <a:gd name="connsiteX0" fmla="*/ 0 w 517585"/>
+              <a:gd name="connsiteY0" fmla="*/ 0 h 1604513"/>
+              <a:gd name="connsiteX1" fmla="*/ 232913 w 517585"/>
+              <a:gd name="connsiteY1" fmla="*/ 905773 h 1604513"/>
+              <a:gd name="connsiteX2" fmla="*/ 517585 w 517585"/>
+              <a:gd name="connsiteY2" fmla="*/ 1604513 h 1604513"/>
+            </a:gdLst>
+            <a:ahLst/>
+            <a:cxnLst>
+              <a:cxn ang="0">
+                <a:pos x="connsiteX0" y="connsiteY0"/>
+              </a:cxn>
+              <a:cxn ang="0">
+                <a:pos x="connsiteX1" y="connsiteY1"/>
+              </a:cxn>
+              <a:cxn ang="0">
+                <a:pos x="connsiteX2" y="connsiteY2"/>
+              </a:cxn>
+            </a:cxnLst>
+            <a:rect l="l" t="t" r="r" b="b"/>
+            <a:pathLst>
+              <a:path w="517585" h="1604513">
+                <a:moveTo>
+                  <a:pt x="0" y="0"/>
+                </a:moveTo>
+                <a:cubicBezTo>
+                  <a:pt x="73324" y="319177"/>
+                  <a:pt x="146649" y="638354"/>
+                  <a:pt x="232913" y="905773"/>
+                </a:cubicBezTo>
+                <a:cubicBezTo>
+                  <a:pt x="319177" y="1173192"/>
+                  <a:pt x="418381" y="1388852"/>
+                  <a:pt x="517585" y="1604513"/>
+                </a:cubicBezTo>
+              </a:path>
+            </a:pathLst>
+          </a:custGeom>
+          <a:noFill/>
+          <a:ln w="76200">
+            <a:solidFill>
+              <a:schemeClr val="accent6">
+                <a:lumMod val="75000"/>
+              </a:schemeClr>
+            </a:solidFill>
+            <a:headEnd type="none" w="med" len="med"/>
+            <a:tailEnd type="triangle" w="med" len="med"/>
+          </a:ln>
+          <a:effectLst>
+            <a:outerShdw blurRad="50800" dist="38100" dir="2700000" algn="tl" rotWithShape="0">
+              <a:prstClr val="black">
+                <a:alpha val="40000"/>
+              </a:prstClr>
+            </a:outerShdw>
+          </a:effectLst>
+        </p:spPr>
+        <p:style>
+          <a:lnRef idx="2">
+            <a:schemeClr val="accent1">
+              <a:shade val="50000"/>
+            </a:schemeClr>
+          </a:lnRef>
+          <a:fillRef idx="1">
+            <a:schemeClr val="accent1"/>
+          </a:fillRef>
+          <a:effectRef idx="0">
+            <a:schemeClr val="accent1"/>
+          </a:effectRef>
+          <a:fontRef idx="minor">
+            <a:schemeClr val="lt1"/>
+          </a:fontRef>
+        </p:style>
+        <p:txBody>
+          <a:bodyPr rtlCol="0" anchor="ctr"/>
+          <a:lstStyle/>
+          <a:p>
+            <a:pPr algn="ctr"/>
+            <a:endParaRPr lang="en-US" sz="1200"/>
+          </a:p>
+        </p:txBody>
+      </p:sp>
+      <p:sp>
+        <p:nvSpPr>
+          <p:cNvPr id="45" name="Freeform: Shape 44"/>
+          <p:cNvSpPr/>
+          <p:nvPr/>
+        </p:nvSpPr>
+        <p:spPr>
+          <a:xfrm>
+            <a:off x="4572802" y="2777808"/>
+            <a:ext cx="185967" cy="420514"/>
+          </a:xfrm>
+          <a:custGeom>
+            <a:avLst/>
+            <a:gdLst>
+              <a:gd name="connsiteX0" fmla="*/ 286639 w 286639"/>
+              <a:gd name="connsiteY0" fmla="*/ 0 h 724619"/>
+              <a:gd name="connsiteX1" fmla="*/ 1967 w 286639"/>
+              <a:gd name="connsiteY1" fmla="*/ 362309 h 724619"/>
+              <a:gd name="connsiteX2" fmla="*/ 183122 w 286639"/>
+              <a:gd name="connsiteY2" fmla="*/ 724619 h 724619"/>
+            </a:gdLst>
+            <a:ahLst/>
+            <a:cxnLst>
+              <a:cxn ang="0">
+                <a:pos x="connsiteX0" y="connsiteY0"/>
+              </a:cxn>
+              <a:cxn ang="0">
+                <a:pos x="connsiteX1" y="connsiteY1"/>
+              </a:cxn>
+              <a:cxn ang="0">
+                <a:pos x="connsiteX2" y="connsiteY2"/>
+              </a:cxn>
+            </a:cxnLst>
+            <a:rect l="l" t="t" r="r" b="b"/>
+            <a:pathLst>
+              <a:path w="286639" h="724619">
+                <a:moveTo>
+                  <a:pt x="286639" y="0"/>
+                </a:moveTo>
+                <a:cubicBezTo>
+                  <a:pt x="152929" y="120769"/>
+                  <a:pt x="19220" y="241539"/>
+                  <a:pt x="1967" y="362309"/>
+                </a:cubicBezTo>
+                <a:cubicBezTo>
+                  <a:pt x="-15286" y="483079"/>
+                  <a:pt x="83918" y="603849"/>
+                  <a:pt x="183122" y="724619"/>
+                </a:cubicBezTo>
+              </a:path>
+            </a:pathLst>
+          </a:custGeom>
+          <a:noFill/>
+          <a:ln w="76200">
+            <a:headEnd type="none" w="med" len="med"/>
+            <a:tailEnd type="triangle" w="med" len="med"/>
+          </a:ln>
+          <a:effectLst>
+            <a:outerShdw blurRad="50800" dist="38100" dir="2700000" algn="tl" rotWithShape="0">
+              <a:prstClr val="black">
+                <a:alpha val="40000"/>
+              </a:prstClr>
+            </a:outerShdw>
+          </a:effectLst>
+        </p:spPr>
+        <p:style>
+          <a:lnRef idx="2">
+            <a:schemeClr val="accent1">
+              <a:shade val="50000"/>
+            </a:schemeClr>
+          </a:lnRef>
+          <a:fillRef idx="1">
+            <a:schemeClr val="accent1"/>
+          </a:fillRef>
+          <a:effectRef idx="0">
+            <a:schemeClr val="accent1"/>
+          </a:effectRef>
+          <a:fontRef idx="minor">
+            <a:schemeClr val="lt1"/>
+          </a:fontRef>
+        </p:style>
+        <p:txBody>
+          <a:bodyPr rtlCol="0" anchor="ctr"/>
+          <a:lstStyle/>
+          <a:p>
+            <a:pPr algn="ctr"/>
+            <a:endParaRPr lang="en-US" sz="1200"/>
+          </a:p>
+        </p:txBody>
+      </p:sp>
+      <p:sp>
+        <p:nvSpPr>
+          <p:cNvPr id="46" name="Freeform: Shape 45"/>
+          <p:cNvSpPr/>
+          <p:nvPr/>
+        </p:nvSpPr>
+        <p:spPr>
+          <a:xfrm>
+            <a:off x="4372480" y="2732752"/>
+            <a:ext cx="419868" cy="1141395"/>
+          </a:xfrm>
+          <a:custGeom>
+            <a:avLst/>
+            <a:gdLst>
+              <a:gd name="connsiteX0" fmla="*/ 595403 w 647161"/>
+              <a:gd name="connsiteY0" fmla="*/ 0 h 1966823"/>
+              <a:gd name="connsiteX1" fmla="*/ 180 w 647161"/>
+              <a:gd name="connsiteY1" fmla="*/ 569343 h 1966823"/>
+              <a:gd name="connsiteX2" fmla="*/ 647161 w 647161"/>
+              <a:gd name="connsiteY2" fmla="*/ 1966823 h 1966823"/>
+            </a:gdLst>
+            <a:ahLst/>
+            <a:cxnLst>
+              <a:cxn ang="0">
+                <a:pos x="connsiteX0" y="connsiteY0"/>
+              </a:cxn>
+              <a:cxn ang="0">
+                <a:pos x="connsiteX1" y="connsiteY1"/>
+              </a:cxn>
+              <a:cxn ang="0">
+                <a:pos x="connsiteX2" y="connsiteY2"/>
+              </a:cxn>
+            </a:cxnLst>
+            <a:rect l="l" t="t" r="r" b="b"/>
+            <a:pathLst>
+              <a:path w="647161" h="1966823">
+                <a:moveTo>
+                  <a:pt x="595403" y="0"/>
+                </a:moveTo>
+                <a:cubicBezTo>
+                  <a:pt x="293478" y="120769"/>
+                  <a:pt x="-8446" y="241539"/>
+                  <a:pt x="180" y="569343"/>
+                </a:cubicBezTo>
+                <a:cubicBezTo>
+                  <a:pt x="8806" y="897147"/>
+                  <a:pt x="327983" y="1431985"/>
+                  <a:pt x="647161" y="1966823"/>
+                </a:cubicBezTo>
+              </a:path>
+            </a:pathLst>
+          </a:custGeom>
+          <a:noFill/>
+          <a:ln w="76200">
+            <a:headEnd type="none" w="med" len="med"/>
+            <a:tailEnd type="triangle" w="med" len="med"/>
+          </a:ln>
+          <a:effectLst>
+            <a:outerShdw blurRad="50800" dist="38100" dir="2700000" algn="tl" rotWithShape="0">
+              <a:prstClr val="black">
+                <a:alpha val="40000"/>
+              </a:prstClr>
+            </a:outerShdw>
+          </a:effectLst>
+        </p:spPr>
+        <p:style>
+          <a:lnRef idx="2">
+            <a:schemeClr val="accent1">
+              <a:shade val="50000"/>
+            </a:schemeClr>
+          </a:lnRef>
+          <a:fillRef idx="1">
+            <a:schemeClr val="accent1"/>
+          </a:fillRef>
+          <a:effectRef idx="0">
+            <a:schemeClr val="accent1"/>
+          </a:effectRef>
+          <a:fontRef idx="minor">
+            <a:schemeClr val="lt1"/>
+          </a:fontRef>
+        </p:style>
+        <p:txBody>
+          <a:bodyPr rtlCol="0" anchor="ctr"/>
+          <a:lstStyle/>
+          <a:p>
+            <a:pPr algn="ctr"/>
+            <a:endParaRPr lang="en-US" sz="1200"/>
+          </a:p>
+        </p:txBody>
+      </p:sp>
+      <p:sp>
+        <p:nvSpPr>
+          <p:cNvPr id="47" name="Freeform: Shape 46"/>
+          <p:cNvSpPr/>
+          <p:nvPr/>
+        </p:nvSpPr>
+        <p:spPr>
+          <a:xfrm>
+            <a:off x="4926669" y="2807844"/>
+            <a:ext cx="275103" cy="886082"/>
+          </a:xfrm>
+          <a:custGeom>
+            <a:avLst/>
+            <a:gdLst>
+              <a:gd name="connsiteX0" fmla="*/ 0 w 424028"/>
+              <a:gd name="connsiteY0" fmla="*/ 0 h 1526875"/>
+              <a:gd name="connsiteX1" fmla="*/ 310551 w 424028"/>
+              <a:gd name="connsiteY1" fmla="*/ 543464 h 1526875"/>
+              <a:gd name="connsiteX2" fmla="*/ 414068 w 424028"/>
+              <a:gd name="connsiteY2" fmla="*/ 1423359 h 1526875"/>
+              <a:gd name="connsiteX3" fmla="*/ 414068 w 424028"/>
+              <a:gd name="connsiteY3" fmla="*/ 1475117 h 1526875"/>
+            </a:gdLst>
+            <a:ahLst/>
+            <a:cxnLst>
+              <a:cxn ang="0">
+                <a:pos x="connsiteX0" y="connsiteY0"/>
+              </a:cxn>
+              <a:cxn ang="0">
+                <a:pos x="connsiteX1" y="connsiteY1"/>
+              </a:cxn>
+              <a:cxn ang="0">
+                <a:pos x="connsiteX2" y="connsiteY2"/>
+              </a:cxn>
+              <a:cxn ang="0">
+                <a:pos x="connsiteX3" y="connsiteY3"/>
+              </a:cxn>
+            </a:cxnLst>
+            <a:rect l="l" t="t" r="r" b="b"/>
+            <a:pathLst>
+              <a:path w="424028" h="1526875">
+                <a:moveTo>
+                  <a:pt x="0" y="0"/>
+                </a:moveTo>
+                <a:cubicBezTo>
+                  <a:pt x="120770" y="153119"/>
+                  <a:pt x="241540" y="306238"/>
+                  <a:pt x="310551" y="543464"/>
+                </a:cubicBezTo>
+                <a:cubicBezTo>
+                  <a:pt x="379562" y="780690"/>
+                  <a:pt x="396815" y="1268084"/>
+                  <a:pt x="414068" y="1423359"/>
+                </a:cubicBezTo>
+                <a:cubicBezTo>
+                  <a:pt x="431321" y="1578634"/>
+                  <a:pt x="422694" y="1526875"/>
+                  <a:pt x="414068" y="1475117"/>
+                </a:cubicBezTo>
+              </a:path>
+            </a:pathLst>
+          </a:custGeom>
+          <a:noFill/>
+          <a:ln w="76200">
+            <a:headEnd type="none" w="med" len="med"/>
+            <a:tailEnd type="triangle" w="med" len="med"/>
+          </a:ln>
+          <a:effectLst>
+            <a:outerShdw blurRad="50800" dist="38100" dir="2700000" algn="tl" rotWithShape="0">
+              <a:prstClr val="black">
+                <a:alpha val="40000"/>
+              </a:prstClr>
+            </a:outerShdw>
+          </a:effectLst>
+        </p:spPr>
+        <p:style>
+          <a:lnRef idx="2">
+            <a:schemeClr val="accent1">
+              <a:shade val="50000"/>
+            </a:schemeClr>
+          </a:lnRef>
+          <a:fillRef idx="1">
+            <a:schemeClr val="accent1"/>
+          </a:fillRef>
+          <a:effectRef idx="0">
+            <a:schemeClr val="accent1"/>
+          </a:effectRef>
+          <a:fontRef idx="minor">
+            <a:schemeClr val="lt1"/>
+          </a:fontRef>
+        </p:style>
+        <p:txBody>
+          <a:bodyPr rtlCol="0" anchor="ctr"/>
+          <a:lstStyle/>
+          <a:p>
+            <a:pPr algn="ctr"/>
+            <a:endParaRPr lang="en-US" sz="1200"/>
+          </a:p>
+        </p:txBody>
+      </p:sp>
+      <p:sp>
+        <p:nvSpPr>
+          <p:cNvPr id="48" name="Freeform: Shape 47"/>
+          <p:cNvSpPr/>
+          <p:nvPr/>
+        </p:nvSpPr>
+        <p:spPr>
+          <a:xfrm>
+            <a:off x="4977039" y="2792826"/>
+            <a:ext cx="671603" cy="690844"/>
+          </a:xfrm>
+          <a:custGeom>
+            <a:avLst/>
+            <a:gdLst>
+              <a:gd name="connsiteX0" fmla="*/ 0 w 1035170"/>
+              <a:gd name="connsiteY0" fmla="*/ 0 h 1190445"/>
+              <a:gd name="connsiteX1" fmla="*/ 854015 w 1035170"/>
+              <a:gd name="connsiteY1" fmla="*/ 517585 h 1190445"/>
+              <a:gd name="connsiteX2" fmla="*/ 1035170 w 1035170"/>
+              <a:gd name="connsiteY2" fmla="*/ 1190445 h 1190445"/>
+            </a:gdLst>
+            <a:ahLst/>
+            <a:cxnLst>
+              <a:cxn ang="0">
+                <a:pos x="connsiteX0" y="connsiteY0"/>
+              </a:cxn>
+              <a:cxn ang="0">
+                <a:pos x="connsiteX1" y="connsiteY1"/>
+              </a:cxn>
+              <a:cxn ang="0">
+                <a:pos x="connsiteX2" y="connsiteY2"/>
+              </a:cxn>
+            </a:cxnLst>
+            <a:rect l="l" t="t" r="r" b="b"/>
+            <a:pathLst>
+              <a:path w="1035170" h="1190445">
+                <a:moveTo>
+                  <a:pt x="0" y="0"/>
+                </a:moveTo>
+                <a:cubicBezTo>
+                  <a:pt x="340743" y="159589"/>
+                  <a:pt x="681487" y="319178"/>
+                  <a:pt x="854015" y="517585"/>
+                </a:cubicBezTo>
+                <a:cubicBezTo>
+                  <a:pt x="1026543" y="715992"/>
+                  <a:pt x="1030856" y="953218"/>
+                  <a:pt x="1035170" y="1190445"/>
+                </a:cubicBezTo>
+              </a:path>
+            </a:pathLst>
+          </a:custGeom>
+          <a:noFill/>
+          <a:ln w="76200">
+            <a:headEnd type="none" w="med" len="med"/>
+            <a:tailEnd type="triangle" w="med" len="med"/>
+          </a:ln>
+          <a:effectLst>
+            <a:outerShdw blurRad="50800" dist="38100" dir="2700000" algn="tl" rotWithShape="0">
+              <a:prstClr val="black">
+                <a:alpha val="40000"/>
+              </a:prstClr>
+            </a:outerShdw>
+          </a:effectLst>
+        </p:spPr>
+        <p:style>
+          <a:lnRef idx="2">
+            <a:schemeClr val="accent1">
+              <a:shade val="50000"/>
+            </a:schemeClr>
+          </a:lnRef>
+          <a:fillRef idx="1">
+            <a:schemeClr val="accent1"/>
+          </a:fillRef>
+          <a:effectRef idx="0">
+            <a:schemeClr val="accent1"/>
+          </a:effectRef>
+          <a:fontRef idx="minor">
+            <a:schemeClr val="lt1"/>
+          </a:fontRef>
+        </p:style>
+        <p:txBody>
+          <a:bodyPr rtlCol="0" anchor="ctr"/>
+          <a:lstStyle/>
+          <a:p>
+            <a:pPr algn="ctr"/>
+            <a:endParaRPr lang="en-US" sz="1200"/>
+          </a:p>
+        </p:txBody>
+      </p:sp>
+      <p:pic>
+        <p:nvPicPr>
+          <p:cNvPr id="49" name="Picture 48"/>
+          <p:cNvPicPr>
+            <a:picLocks noChangeAspect="1"/>
+          </p:cNvPicPr>
+          <p:nvPr/>
+        </p:nvPicPr>
+        <p:blipFill>
+          <a:blip r:embed="rId5">
+            <a:extLst>
+              <a:ext uri="{28A0092B-C50C-407E-A947-70E740481C1C}">
+                <a14:useLocalDpi xmlns:a14="http://schemas.microsoft.com/office/drawing/2010/main" val="0"/>
+              </a:ext>
+            </a:extLst>
+          </a:blip>
+          <a:stretch>
+            <a:fillRect/>
+          </a:stretch>
+        </p:blipFill>
+        <p:spPr>
+          <a:xfrm>
+            <a:off x="8392951" y="3249551"/>
+            <a:ext cx="823048" cy="736199"/>
+          </a:xfrm>
+          <a:prstGeom prst="rect">
+            <a:avLst/>
+          </a:prstGeom>
+        </p:spPr>
+      </p:pic>
+      <p:sp>
+        <p:nvSpPr>
+          <p:cNvPr id="51" name="TextBox 50"/>
           <p:cNvSpPr txBox="1"/>
           <p:nvPr/>
         </p:nvSpPr>
         <p:spPr>
           <a:xfrm>
-            <a:off x="7477125" y="952500"/>
-            <a:ext cx="1685925" cy="369332"/>
+            <a:off x="6921074" y="1293390"/>
+            <a:ext cx="1093803" cy="276999"/>
           </a:xfrm>
           <a:prstGeom prst="rect">
             <a:avLst/>
@@ -3952,7 +4938,7 @@
           <a:lstStyle/>
           <a:p>
             <a:r>
-              <a:rPr lang="en-US" dirty="0"/>
+              <a:rPr lang="en-US" sz="1200" dirty="0"/>
               <a:t>Objects</a:t>
             </a:r>
           </a:p>
@@ -3960,14 +4946,14 @@
       </p:sp>
       <p:sp>
         <p:nvSpPr>
-          <p:cNvPr id="33" name="TextBox 32"/>
+          <p:cNvPr id="52" name="TextBox 51"/>
           <p:cNvSpPr txBox="1"/>
           <p:nvPr/>
         </p:nvSpPr>
         <p:spPr>
           <a:xfrm>
-            <a:off x="7477125" y="2937557"/>
-            <a:ext cx="1685925" cy="369332"/>
+            <a:off x="6722672" y="2402235"/>
+            <a:ext cx="1093803" cy="461665"/>
           </a:xfrm>
           <a:prstGeom prst="rect">
             <a:avLst/>
@@ -3980,23 +4966,31 @@
           </a:bodyPr>
           <a:lstStyle/>
           <a:p>
-            <a:r>
-              <a:rPr lang="en-US" dirty="0"/>
-              <a:t>Index</a:t>
-            </a:r>
-          </a:p>
-        </p:txBody>
-      </p:sp>
-      <p:sp>
-        <p:nvSpPr>
-          <p:cNvPr id="34" name="TextBox 33"/>
+            <a:pPr algn="ctr"/>
+            <a:r>
+              <a:rPr lang="en-US" sz="1200" dirty="0"/>
+              <a:t>Container</a:t>
+            </a:r>
+            <a:br>
+              <a:rPr lang="en-US" sz="1200" dirty="0"/>
+            </a:br>
+            <a:r>
+              <a:rPr lang="en-US" sz="1200" dirty="0"/>
+              <a:t>Indices</a:t>
+            </a:r>
+          </a:p>
+        </p:txBody>
+      </p:sp>
+      <p:sp>
+        <p:nvSpPr>
+          <p:cNvPr id="53" name="TextBox 52"/>
           <p:cNvSpPr txBox="1"/>
           <p:nvPr/>
         </p:nvSpPr>
         <p:spPr>
           <a:xfrm>
-            <a:off x="7686676" y="4857064"/>
-            <a:ext cx="990600" cy="646331"/>
+            <a:off x="8454839" y="3483026"/>
+            <a:ext cx="642686" cy="461665"/>
           </a:xfrm>
           <a:prstGeom prst="rect">
             <a:avLst/>
@@ -4011,14 +5005,14 @@
           <a:p>
             <a:pPr algn="ctr"/>
             <a:r>
-              <a:rPr lang="en-US" dirty="0"/>
+              <a:rPr lang="en-US" sz="1200" dirty="0"/>
               <a:t>Chunk</a:t>
             </a:r>
             <a:br>
-              <a:rPr lang="en-US" dirty="0"/>
+              <a:rPr lang="en-US" sz="1200" dirty="0"/>
             </a:br>
             <a:r>
-              <a:rPr lang="en-US" dirty="0"/>
+              <a:rPr lang="en-US" sz="1200" dirty="0"/>
               <a:t>Folder</a:t>
             </a:r>
           </a:p>
@@ -4026,14 +5020,14 @@
       </p:sp>
       <p:sp>
         <p:nvSpPr>
-          <p:cNvPr id="35" name="TextBox 34"/>
+          <p:cNvPr id="54" name="TextBox 53"/>
           <p:cNvSpPr txBox="1"/>
           <p:nvPr/>
         </p:nvSpPr>
         <p:spPr>
           <a:xfrm>
-            <a:off x="3877185" y="5135001"/>
-            <a:ext cx="990600" cy="646331"/>
+            <a:off x="4007511" y="3720596"/>
+            <a:ext cx="642686" cy="461665"/>
           </a:xfrm>
           <a:prstGeom prst="rect">
             <a:avLst/>
@@ -4048,15 +5042,983 @@
           <a:p>
             <a:pPr algn="ctr"/>
             <a:r>
-              <a:rPr lang="en-US" dirty="0"/>
+              <a:rPr lang="en-US" sz="1200" dirty="0"/>
               <a:t>Chunk</a:t>
             </a:r>
             <a:br>
-              <a:rPr lang="en-US" dirty="0"/>
+              <a:rPr lang="en-US" sz="1200" dirty="0"/>
             </a:br>
             <a:r>
-              <a:rPr lang="en-US" dirty="0"/>
+              <a:rPr lang="en-US" sz="1200" dirty="0"/>
               <a:t>Map</a:t>
+            </a:r>
+          </a:p>
+        </p:txBody>
+      </p:sp>
+      <p:pic>
+        <p:nvPicPr>
+          <p:cNvPr id="55" name="Picture 54"/>
+          <p:cNvPicPr>
+            <a:picLocks noChangeAspect="1"/>
+          </p:cNvPicPr>
+          <p:nvPr/>
+        </p:nvPicPr>
+        <p:blipFill>
+          <a:blip r:embed="rId2">
+            <a:extLst>
+              <a:ext uri="{28A0092B-C50C-407E-A947-70E740481C1C}">
+                <a14:useLocalDpi xmlns:a14="http://schemas.microsoft.com/office/drawing/2010/main" val="0"/>
+              </a:ext>
+            </a:extLst>
+          </a:blip>
+          <a:stretch>
+            <a:fillRect/>
+          </a:stretch>
+        </p:blipFill>
+        <p:spPr>
+          <a:xfrm>
+            <a:off x="5664110" y="2052886"/>
+            <a:ext cx="1301435" cy="1164106"/>
+          </a:xfrm>
+          <a:prstGeom prst="rect">
+            <a:avLst/>
+          </a:prstGeom>
+        </p:spPr>
+      </p:pic>
+      <p:sp>
+        <p:nvSpPr>
+          <p:cNvPr id="43" name="Freeform: Shape 42"/>
+          <p:cNvSpPr/>
+          <p:nvPr/>
+        </p:nvSpPr>
+        <p:spPr>
+          <a:xfrm flipH="1">
+            <a:off x="6359506" y="1623755"/>
+            <a:ext cx="203652" cy="931137"/>
+          </a:xfrm>
+          <a:custGeom>
+            <a:avLst/>
+            <a:gdLst>
+              <a:gd name="connsiteX0" fmla="*/ 0 w 517585"/>
+              <a:gd name="connsiteY0" fmla="*/ 0 h 1604513"/>
+              <a:gd name="connsiteX1" fmla="*/ 232913 w 517585"/>
+              <a:gd name="connsiteY1" fmla="*/ 905773 h 1604513"/>
+              <a:gd name="connsiteX2" fmla="*/ 517585 w 517585"/>
+              <a:gd name="connsiteY2" fmla="*/ 1604513 h 1604513"/>
+            </a:gdLst>
+            <a:ahLst/>
+            <a:cxnLst>
+              <a:cxn ang="0">
+                <a:pos x="connsiteX0" y="connsiteY0"/>
+              </a:cxn>
+              <a:cxn ang="0">
+                <a:pos x="connsiteX1" y="connsiteY1"/>
+              </a:cxn>
+              <a:cxn ang="0">
+                <a:pos x="connsiteX2" y="connsiteY2"/>
+              </a:cxn>
+            </a:cxnLst>
+            <a:rect l="l" t="t" r="r" b="b"/>
+            <a:pathLst>
+              <a:path w="517585" h="1604513">
+                <a:moveTo>
+                  <a:pt x="0" y="0"/>
+                </a:moveTo>
+                <a:cubicBezTo>
+                  <a:pt x="73324" y="319177"/>
+                  <a:pt x="146649" y="638354"/>
+                  <a:pt x="232913" y="905773"/>
+                </a:cubicBezTo>
+                <a:cubicBezTo>
+                  <a:pt x="319177" y="1173192"/>
+                  <a:pt x="418381" y="1388852"/>
+                  <a:pt x="517585" y="1604513"/>
+                </a:cubicBezTo>
+              </a:path>
+            </a:pathLst>
+          </a:custGeom>
+          <a:noFill/>
+          <a:ln w="76200">
+            <a:solidFill>
+              <a:schemeClr val="accent6">
+                <a:lumMod val="75000"/>
+              </a:schemeClr>
+            </a:solidFill>
+            <a:headEnd type="none" w="med" len="med"/>
+            <a:tailEnd type="triangle" w="med" len="med"/>
+          </a:ln>
+          <a:effectLst>
+            <a:outerShdw blurRad="50800" dist="38100" dir="2700000" algn="tl" rotWithShape="0">
+              <a:prstClr val="black">
+                <a:alpha val="40000"/>
+              </a:prstClr>
+            </a:outerShdw>
+          </a:effectLst>
+        </p:spPr>
+        <p:style>
+          <a:lnRef idx="2">
+            <a:schemeClr val="accent1">
+              <a:shade val="50000"/>
+            </a:schemeClr>
+          </a:lnRef>
+          <a:fillRef idx="1">
+            <a:schemeClr val="accent1"/>
+          </a:fillRef>
+          <a:effectRef idx="0">
+            <a:schemeClr val="accent1"/>
+          </a:effectRef>
+          <a:fontRef idx="minor">
+            <a:schemeClr val="lt1"/>
+          </a:fontRef>
+        </p:style>
+        <p:txBody>
+          <a:bodyPr rtlCol="0" anchor="ctr"/>
+          <a:lstStyle/>
+          <a:p>
+            <a:pPr algn="ctr"/>
+            <a:endParaRPr lang="en-US" sz="1200"/>
+          </a:p>
+        </p:txBody>
+      </p:sp>
+      <p:pic>
+        <p:nvPicPr>
+          <p:cNvPr id="56" name="Picture 55"/>
+          <p:cNvPicPr>
+            <a:picLocks noChangeAspect="1"/>
+          </p:cNvPicPr>
+          <p:nvPr/>
+        </p:nvPicPr>
+        <p:blipFill>
+          <a:blip r:embed="rId2">
+            <a:extLst>
+              <a:ext uri="{28A0092B-C50C-407E-A947-70E740481C1C}">
+                <a14:useLocalDpi xmlns:a14="http://schemas.microsoft.com/office/drawing/2010/main" val="0"/>
+              </a:ext>
+            </a:extLst>
+          </a:blip>
+          <a:stretch>
+            <a:fillRect/>
+          </a:stretch>
+        </p:blipFill>
+        <p:spPr>
+          <a:xfrm>
+            <a:off x="7811102" y="2052886"/>
+            <a:ext cx="1301435" cy="1164106"/>
+          </a:xfrm>
+          <a:prstGeom prst="rect">
+            <a:avLst/>
+          </a:prstGeom>
+        </p:spPr>
+      </p:pic>
+      <p:pic>
+        <p:nvPicPr>
+          <p:cNvPr id="57" name="Picture 56"/>
+          <p:cNvPicPr>
+            <a:picLocks noChangeAspect="1"/>
+          </p:cNvPicPr>
+          <p:nvPr/>
+        </p:nvPicPr>
+        <p:blipFill>
+          <a:blip r:embed="rId3">
+            <a:extLst>
+              <a:ext uri="{28A0092B-C50C-407E-A947-70E740481C1C}">
+                <a14:useLocalDpi xmlns:a14="http://schemas.microsoft.com/office/drawing/2010/main" val="0"/>
+              </a:ext>
+            </a:extLst>
+          </a:blip>
+          <a:stretch>
+            <a:fillRect/>
+          </a:stretch>
+        </p:blipFill>
+        <p:spPr>
+          <a:xfrm>
+            <a:off x="6118832" y="3140941"/>
+            <a:ext cx="1155923" cy="1033948"/>
+          </a:xfrm>
+          <a:prstGeom prst="rect">
+            <a:avLst/>
+          </a:prstGeom>
+        </p:spPr>
+      </p:pic>
+      <p:sp>
+        <p:nvSpPr>
+          <p:cNvPr id="58" name="Freeform: Shape 57"/>
+          <p:cNvSpPr/>
+          <p:nvPr/>
+        </p:nvSpPr>
+        <p:spPr>
+          <a:xfrm>
+            <a:off x="6044997" y="2772724"/>
+            <a:ext cx="185967" cy="420514"/>
+          </a:xfrm>
+          <a:custGeom>
+            <a:avLst/>
+            <a:gdLst>
+              <a:gd name="connsiteX0" fmla="*/ 286639 w 286639"/>
+              <a:gd name="connsiteY0" fmla="*/ 0 h 724619"/>
+              <a:gd name="connsiteX1" fmla="*/ 1967 w 286639"/>
+              <a:gd name="connsiteY1" fmla="*/ 362309 h 724619"/>
+              <a:gd name="connsiteX2" fmla="*/ 183122 w 286639"/>
+              <a:gd name="connsiteY2" fmla="*/ 724619 h 724619"/>
+            </a:gdLst>
+            <a:ahLst/>
+            <a:cxnLst>
+              <a:cxn ang="0">
+                <a:pos x="connsiteX0" y="connsiteY0"/>
+              </a:cxn>
+              <a:cxn ang="0">
+                <a:pos x="connsiteX1" y="connsiteY1"/>
+              </a:cxn>
+              <a:cxn ang="0">
+                <a:pos x="connsiteX2" y="connsiteY2"/>
+              </a:cxn>
+            </a:cxnLst>
+            <a:rect l="l" t="t" r="r" b="b"/>
+            <a:pathLst>
+              <a:path w="286639" h="724619">
+                <a:moveTo>
+                  <a:pt x="286639" y="0"/>
+                </a:moveTo>
+                <a:cubicBezTo>
+                  <a:pt x="152929" y="120769"/>
+                  <a:pt x="19220" y="241539"/>
+                  <a:pt x="1967" y="362309"/>
+                </a:cubicBezTo>
+                <a:cubicBezTo>
+                  <a:pt x="-15286" y="483079"/>
+                  <a:pt x="83918" y="603849"/>
+                  <a:pt x="183122" y="724619"/>
+                </a:cubicBezTo>
+              </a:path>
+            </a:pathLst>
+          </a:custGeom>
+          <a:noFill/>
+          <a:ln w="76200">
+            <a:headEnd type="none" w="med" len="med"/>
+            <a:tailEnd type="triangle" w="med" len="med"/>
+          </a:ln>
+          <a:effectLst>
+            <a:outerShdw blurRad="50800" dist="38100" dir="2700000" algn="tl" rotWithShape="0">
+              <a:prstClr val="black">
+                <a:alpha val="40000"/>
+              </a:prstClr>
+            </a:outerShdw>
+          </a:effectLst>
+        </p:spPr>
+        <p:style>
+          <a:lnRef idx="2">
+            <a:schemeClr val="accent1">
+              <a:shade val="50000"/>
+            </a:schemeClr>
+          </a:lnRef>
+          <a:fillRef idx="1">
+            <a:schemeClr val="accent1"/>
+          </a:fillRef>
+          <a:effectRef idx="0">
+            <a:schemeClr val="accent1"/>
+          </a:effectRef>
+          <a:fontRef idx="minor">
+            <a:schemeClr val="lt1"/>
+          </a:fontRef>
+        </p:style>
+        <p:txBody>
+          <a:bodyPr rtlCol="0" anchor="ctr"/>
+          <a:lstStyle/>
+          <a:p>
+            <a:pPr algn="ctr"/>
+            <a:endParaRPr lang="en-US" sz="1200"/>
+          </a:p>
+        </p:txBody>
+      </p:sp>
+      <p:sp>
+        <p:nvSpPr>
+          <p:cNvPr id="59" name="Freeform: Shape 58"/>
+          <p:cNvSpPr/>
+          <p:nvPr/>
+        </p:nvSpPr>
+        <p:spPr>
+          <a:xfrm>
+            <a:off x="5844675" y="2727668"/>
+            <a:ext cx="419868" cy="1141395"/>
+          </a:xfrm>
+          <a:custGeom>
+            <a:avLst/>
+            <a:gdLst>
+              <a:gd name="connsiteX0" fmla="*/ 595403 w 647161"/>
+              <a:gd name="connsiteY0" fmla="*/ 0 h 1966823"/>
+              <a:gd name="connsiteX1" fmla="*/ 180 w 647161"/>
+              <a:gd name="connsiteY1" fmla="*/ 569343 h 1966823"/>
+              <a:gd name="connsiteX2" fmla="*/ 647161 w 647161"/>
+              <a:gd name="connsiteY2" fmla="*/ 1966823 h 1966823"/>
+            </a:gdLst>
+            <a:ahLst/>
+            <a:cxnLst>
+              <a:cxn ang="0">
+                <a:pos x="connsiteX0" y="connsiteY0"/>
+              </a:cxn>
+              <a:cxn ang="0">
+                <a:pos x="connsiteX1" y="connsiteY1"/>
+              </a:cxn>
+              <a:cxn ang="0">
+                <a:pos x="connsiteX2" y="connsiteY2"/>
+              </a:cxn>
+            </a:cxnLst>
+            <a:rect l="l" t="t" r="r" b="b"/>
+            <a:pathLst>
+              <a:path w="647161" h="1966823">
+                <a:moveTo>
+                  <a:pt x="595403" y="0"/>
+                </a:moveTo>
+                <a:cubicBezTo>
+                  <a:pt x="293478" y="120769"/>
+                  <a:pt x="-8446" y="241539"/>
+                  <a:pt x="180" y="569343"/>
+                </a:cubicBezTo>
+                <a:cubicBezTo>
+                  <a:pt x="8806" y="897147"/>
+                  <a:pt x="327983" y="1431985"/>
+                  <a:pt x="647161" y="1966823"/>
+                </a:cubicBezTo>
+              </a:path>
+            </a:pathLst>
+          </a:custGeom>
+          <a:noFill/>
+          <a:ln w="76200">
+            <a:headEnd type="none" w="med" len="med"/>
+            <a:tailEnd type="triangle" w="med" len="med"/>
+          </a:ln>
+          <a:effectLst>
+            <a:outerShdw blurRad="50800" dist="38100" dir="2700000" algn="tl" rotWithShape="0">
+              <a:prstClr val="black">
+                <a:alpha val="40000"/>
+              </a:prstClr>
+            </a:outerShdw>
+          </a:effectLst>
+        </p:spPr>
+        <p:style>
+          <a:lnRef idx="2">
+            <a:schemeClr val="accent1">
+              <a:shade val="50000"/>
+            </a:schemeClr>
+          </a:lnRef>
+          <a:fillRef idx="1">
+            <a:schemeClr val="accent1"/>
+          </a:fillRef>
+          <a:effectRef idx="0">
+            <a:schemeClr val="accent1"/>
+          </a:effectRef>
+          <a:fontRef idx="minor">
+            <a:schemeClr val="lt1"/>
+          </a:fontRef>
+        </p:style>
+        <p:txBody>
+          <a:bodyPr rtlCol="0" anchor="ctr"/>
+          <a:lstStyle/>
+          <a:p>
+            <a:pPr algn="ctr"/>
+            <a:endParaRPr lang="en-US" sz="1200"/>
+          </a:p>
+        </p:txBody>
+      </p:sp>
+      <p:sp>
+        <p:nvSpPr>
+          <p:cNvPr id="60" name="Freeform: Shape 59"/>
+          <p:cNvSpPr/>
+          <p:nvPr/>
+        </p:nvSpPr>
+        <p:spPr>
+          <a:xfrm>
+            <a:off x="6398864" y="2802760"/>
+            <a:ext cx="275103" cy="886082"/>
+          </a:xfrm>
+          <a:custGeom>
+            <a:avLst/>
+            <a:gdLst>
+              <a:gd name="connsiteX0" fmla="*/ 0 w 424028"/>
+              <a:gd name="connsiteY0" fmla="*/ 0 h 1526875"/>
+              <a:gd name="connsiteX1" fmla="*/ 310551 w 424028"/>
+              <a:gd name="connsiteY1" fmla="*/ 543464 h 1526875"/>
+              <a:gd name="connsiteX2" fmla="*/ 414068 w 424028"/>
+              <a:gd name="connsiteY2" fmla="*/ 1423359 h 1526875"/>
+              <a:gd name="connsiteX3" fmla="*/ 414068 w 424028"/>
+              <a:gd name="connsiteY3" fmla="*/ 1475117 h 1526875"/>
+            </a:gdLst>
+            <a:ahLst/>
+            <a:cxnLst>
+              <a:cxn ang="0">
+                <a:pos x="connsiteX0" y="connsiteY0"/>
+              </a:cxn>
+              <a:cxn ang="0">
+                <a:pos x="connsiteX1" y="connsiteY1"/>
+              </a:cxn>
+              <a:cxn ang="0">
+                <a:pos x="connsiteX2" y="connsiteY2"/>
+              </a:cxn>
+              <a:cxn ang="0">
+                <a:pos x="connsiteX3" y="connsiteY3"/>
+              </a:cxn>
+            </a:cxnLst>
+            <a:rect l="l" t="t" r="r" b="b"/>
+            <a:pathLst>
+              <a:path w="424028" h="1526875">
+                <a:moveTo>
+                  <a:pt x="0" y="0"/>
+                </a:moveTo>
+                <a:cubicBezTo>
+                  <a:pt x="120770" y="153119"/>
+                  <a:pt x="241540" y="306238"/>
+                  <a:pt x="310551" y="543464"/>
+                </a:cubicBezTo>
+                <a:cubicBezTo>
+                  <a:pt x="379562" y="780690"/>
+                  <a:pt x="396815" y="1268084"/>
+                  <a:pt x="414068" y="1423359"/>
+                </a:cubicBezTo>
+                <a:cubicBezTo>
+                  <a:pt x="431321" y="1578634"/>
+                  <a:pt x="422694" y="1526875"/>
+                  <a:pt x="414068" y="1475117"/>
+                </a:cubicBezTo>
+              </a:path>
+            </a:pathLst>
+          </a:custGeom>
+          <a:noFill/>
+          <a:ln w="76200">
+            <a:headEnd type="none" w="med" len="med"/>
+            <a:tailEnd type="triangle" w="med" len="med"/>
+          </a:ln>
+          <a:effectLst>
+            <a:outerShdw blurRad="50800" dist="38100" dir="2700000" algn="tl" rotWithShape="0">
+              <a:prstClr val="black">
+                <a:alpha val="40000"/>
+              </a:prstClr>
+            </a:outerShdw>
+          </a:effectLst>
+        </p:spPr>
+        <p:style>
+          <a:lnRef idx="2">
+            <a:schemeClr val="accent1">
+              <a:shade val="50000"/>
+            </a:schemeClr>
+          </a:lnRef>
+          <a:fillRef idx="1">
+            <a:schemeClr val="accent1"/>
+          </a:fillRef>
+          <a:effectRef idx="0">
+            <a:schemeClr val="accent1"/>
+          </a:effectRef>
+          <a:fontRef idx="minor">
+            <a:schemeClr val="lt1"/>
+          </a:fontRef>
+        </p:style>
+        <p:txBody>
+          <a:bodyPr rtlCol="0" anchor="ctr"/>
+          <a:lstStyle/>
+          <a:p>
+            <a:pPr algn="ctr"/>
+            <a:endParaRPr lang="en-US" sz="1200"/>
+          </a:p>
+        </p:txBody>
+      </p:sp>
+      <p:sp>
+        <p:nvSpPr>
+          <p:cNvPr id="61" name="Freeform: Shape 60"/>
+          <p:cNvSpPr/>
+          <p:nvPr/>
+        </p:nvSpPr>
+        <p:spPr>
+          <a:xfrm>
+            <a:off x="6449234" y="2787742"/>
+            <a:ext cx="671603" cy="690844"/>
+          </a:xfrm>
+          <a:custGeom>
+            <a:avLst/>
+            <a:gdLst>
+              <a:gd name="connsiteX0" fmla="*/ 0 w 1035170"/>
+              <a:gd name="connsiteY0" fmla="*/ 0 h 1190445"/>
+              <a:gd name="connsiteX1" fmla="*/ 854015 w 1035170"/>
+              <a:gd name="connsiteY1" fmla="*/ 517585 h 1190445"/>
+              <a:gd name="connsiteX2" fmla="*/ 1035170 w 1035170"/>
+              <a:gd name="connsiteY2" fmla="*/ 1190445 h 1190445"/>
+            </a:gdLst>
+            <a:ahLst/>
+            <a:cxnLst>
+              <a:cxn ang="0">
+                <a:pos x="connsiteX0" y="connsiteY0"/>
+              </a:cxn>
+              <a:cxn ang="0">
+                <a:pos x="connsiteX1" y="connsiteY1"/>
+              </a:cxn>
+              <a:cxn ang="0">
+                <a:pos x="connsiteX2" y="connsiteY2"/>
+              </a:cxn>
+            </a:cxnLst>
+            <a:rect l="l" t="t" r="r" b="b"/>
+            <a:pathLst>
+              <a:path w="1035170" h="1190445">
+                <a:moveTo>
+                  <a:pt x="0" y="0"/>
+                </a:moveTo>
+                <a:cubicBezTo>
+                  <a:pt x="340743" y="159589"/>
+                  <a:pt x="681487" y="319178"/>
+                  <a:pt x="854015" y="517585"/>
+                </a:cubicBezTo>
+                <a:cubicBezTo>
+                  <a:pt x="1026543" y="715992"/>
+                  <a:pt x="1030856" y="953218"/>
+                  <a:pt x="1035170" y="1190445"/>
+                </a:cubicBezTo>
+              </a:path>
+            </a:pathLst>
+          </a:custGeom>
+          <a:noFill/>
+          <a:ln w="76200">
+            <a:headEnd type="none" w="med" len="med"/>
+            <a:tailEnd type="triangle" w="med" len="med"/>
+          </a:ln>
+          <a:effectLst>
+            <a:outerShdw blurRad="50800" dist="38100" dir="2700000" algn="tl" rotWithShape="0">
+              <a:prstClr val="black">
+                <a:alpha val="40000"/>
+              </a:prstClr>
+            </a:outerShdw>
+          </a:effectLst>
+        </p:spPr>
+        <p:style>
+          <a:lnRef idx="2">
+            <a:schemeClr val="accent1">
+              <a:shade val="50000"/>
+            </a:schemeClr>
+          </a:lnRef>
+          <a:fillRef idx="1">
+            <a:schemeClr val="accent1"/>
+          </a:fillRef>
+          <a:effectRef idx="0">
+            <a:schemeClr val="accent1"/>
+          </a:effectRef>
+          <a:fontRef idx="minor">
+            <a:schemeClr val="lt1"/>
+          </a:fontRef>
+        </p:style>
+        <p:txBody>
+          <a:bodyPr rtlCol="0" anchor="ctr"/>
+          <a:lstStyle/>
+          <a:p>
+            <a:pPr algn="ctr"/>
+            <a:endParaRPr lang="en-US" sz="1200"/>
+          </a:p>
+        </p:txBody>
+      </p:sp>
+      <p:pic>
+        <p:nvPicPr>
+          <p:cNvPr id="62" name="Picture 61"/>
+          <p:cNvPicPr>
+            <a:picLocks noChangeAspect="1"/>
+          </p:cNvPicPr>
+          <p:nvPr/>
+        </p:nvPicPr>
+        <p:blipFill>
+          <a:blip r:embed="rId2">
+            <a:extLst>
+              <a:ext uri="{28A0092B-C50C-407E-A947-70E740481C1C}">
+                <a14:useLocalDpi xmlns:a14="http://schemas.microsoft.com/office/drawing/2010/main" val="0"/>
+              </a:ext>
+            </a:extLst>
+          </a:blip>
+          <a:stretch>
+            <a:fillRect/>
+          </a:stretch>
+        </p:blipFill>
+        <p:spPr>
+          <a:xfrm>
+            <a:off x="7982209" y="2345314"/>
+            <a:ext cx="410742" cy="367400"/>
+          </a:xfrm>
+          <a:prstGeom prst="rect">
+            <a:avLst/>
+          </a:prstGeom>
+        </p:spPr>
+      </p:pic>
+      <p:pic>
+        <p:nvPicPr>
+          <p:cNvPr id="63" name="Picture 62"/>
+          <p:cNvPicPr>
+            <a:picLocks noChangeAspect="1"/>
+          </p:cNvPicPr>
+          <p:nvPr/>
+        </p:nvPicPr>
+        <p:blipFill>
+          <a:blip r:embed="rId2">
+            <a:extLst>
+              <a:ext uri="{28A0092B-C50C-407E-A947-70E740481C1C}">
+                <a14:useLocalDpi xmlns:a14="http://schemas.microsoft.com/office/drawing/2010/main" val="0"/>
+              </a:ext>
+            </a:extLst>
+          </a:blip>
+          <a:stretch>
+            <a:fillRect/>
+          </a:stretch>
+        </p:blipFill>
+        <p:spPr>
+          <a:xfrm>
+            <a:off x="7982209" y="2697190"/>
+            <a:ext cx="410742" cy="367400"/>
+          </a:xfrm>
+          <a:prstGeom prst="rect">
+            <a:avLst/>
+          </a:prstGeom>
+        </p:spPr>
+      </p:pic>
+      <p:sp>
+        <p:nvSpPr>
+          <p:cNvPr id="64" name="TextBox 63"/>
+          <p:cNvSpPr txBox="1"/>
+          <p:nvPr/>
+        </p:nvSpPr>
+        <p:spPr>
+          <a:xfrm>
+            <a:off x="8135824" y="2410860"/>
+            <a:ext cx="1093803" cy="461665"/>
+          </a:xfrm>
+          <a:prstGeom prst="rect">
+            <a:avLst/>
+          </a:prstGeom>
+          <a:noFill/>
+        </p:spPr>
+        <p:txBody>
+          <a:bodyPr wrap="square" rtlCol="0">
+            <a:spAutoFit/>
+          </a:bodyPr>
+          <a:lstStyle/>
+          <a:p>
+            <a:pPr algn="ctr"/>
+            <a:r>
+              <a:rPr lang="en-US" sz="1200" dirty="0"/>
+              <a:t>Master</a:t>
+            </a:r>
+            <a:br>
+              <a:rPr lang="en-US" sz="1200" dirty="0"/>
+            </a:br>
+            <a:r>
+              <a:rPr lang="en-US" sz="1200" dirty="0"/>
+              <a:t>Index</a:t>
+            </a:r>
+          </a:p>
+        </p:txBody>
+      </p:sp>
+      <p:sp>
+        <p:nvSpPr>
+          <p:cNvPr id="3" name="Freeform: Shape 2"/>
+          <p:cNvSpPr/>
+          <p:nvPr/>
+        </p:nvSpPr>
+        <p:spPr>
+          <a:xfrm>
+            <a:off x="5426058" y="1882192"/>
+            <a:ext cx="2588819" cy="550457"/>
+          </a:xfrm>
+          <a:custGeom>
+            <a:avLst/>
+            <a:gdLst>
+              <a:gd name="connsiteX0" fmla="*/ 0 w 3053751"/>
+              <a:gd name="connsiteY0" fmla="*/ 291665 h 550457"/>
+              <a:gd name="connsiteX1" fmla="*/ 1630393 w 3053751"/>
+              <a:gd name="connsiteY1" fmla="*/ 6993 h 550457"/>
+              <a:gd name="connsiteX2" fmla="*/ 3053751 w 3053751"/>
+              <a:gd name="connsiteY2" fmla="*/ 550457 h 550457"/>
+            </a:gdLst>
+            <a:ahLst/>
+            <a:cxnLst>
+              <a:cxn ang="0">
+                <a:pos x="connsiteX0" y="connsiteY0"/>
+              </a:cxn>
+              <a:cxn ang="0">
+                <a:pos x="connsiteX1" y="connsiteY1"/>
+              </a:cxn>
+              <a:cxn ang="0">
+                <a:pos x="connsiteX2" y="connsiteY2"/>
+              </a:cxn>
+            </a:cxnLst>
+            <a:rect l="l" t="t" r="r" b="b"/>
+            <a:pathLst>
+              <a:path w="3053751" h="550457">
+                <a:moveTo>
+                  <a:pt x="0" y="291665"/>
+                </a:moveTo>
+                <a:cubicBezTo>
+                  <a:pt x="560717" y="127763"/>
+                  <a:pt x="1121435" y="-36139"/>
+                  <a:pt x="1630393" y="6993"/>
+                </a:cubicBezTo>
+                <a:cubicBezTo>
+                  <a:pt x="2139351" y="50125"/>
+                  <a:pt x="2596551" y="300291"/>
+                  <a:pt x="3053751" y="550457"/>
+                </a:cubicBezTo>
+              </a:path>
+            </a:pathLst>
+          </a:custGeom>
+          <a:noFill/>
+          <a:ln w="38100">
+            <a:solidFill>
+              <a:schemeClr val="accent2">
+                <a:lumMod val="60000"/>
+                <a:lumOff val="40000"/>
+              </a:schemeClr>
+            </a:solidFill>
+            <a:prstDash val="sysDash"/>
+            <a:headEnd type="none" w="med" len="med"/>
+            <a:tailEnd type="triangle" w="med" len="med"/>
+          </a:ln>
+          <a:effectLst>
+            <a:outerShdw blurRad="50800" dist="38100" dir="2700000" algn="tl" rotWithShape="0">
+              <a:prstClr val="black">
+                <a:alpha val="40000"/>
+              </a:prstClr>
+            </a:outerShdw>
+          </a:effectLst>
+        </p:spPr>
+        <p:style>
+          <a:lnRef idx="2">
+            <a:schemeClr val="accent1">
+              <a:shade val="50000"/>
+            </a:schemeClr>
+          </a:lnRef>
+          <a:fillRef idx="1">
+            <a:schemeClr val="accent1"/>
+          </a:fillRef>
+          <a:effectRef idx="0">
+            <a:schemeClr val="accent1"/>
+          </a:effectRef>
+          <a:fontRef idx="minor">
+            <a:schemeClr val="lt1"/>
+          </a:fontRef>
+        </p:style>
+        <p:txBody>
+          <a:bodyPr rtlCol="0" anchor="ctr"/>
+          <a:lstStyle/>
+          <a:p>
+            <a:pPr algn="ctr"/>
+            <a:endParaRPr lang="en-US"/>
+          </a:p>
+        </p:txBody>
+      </p:sp>
+      <p:sp>
+        <p:nvSpPr>
+          <p:cNvPr id="5" name="Freeform: Shape 4"/>
+          <p:cNvSpPr/>
+          <p:nvPr/>
+        </p:nvSpPr>
+        <p:spPr>
+          <a:xfrm>
+            <a:off x="6771780" y="2090432"/>
+            <a:ext cx="1210430" cy="652768"/>
+          </a:xfrm>
+          <a:custGeom>
+            <a:avLst/>
+            <a:gdLst>
+              <a:gd name="connsiteX0" fmla="*/ 0 w 1733909"/>
+              <a:gd name="connsiteY0" fmla="*/ 96822 h 666165"/>
+              <a:gd name="connsiteX1" fmla="*/ 543464 w 1733909"/>
+              <a:gd name="connsiteY1" fmla="*/ 45063 h 666165"/>
+              <a:gd name="connsiteX2" fmla="*/ 1733909 w 1733909"/>
+              <a:gd name="connsiteY2" fmla="*/ 666165 h 666165"/>
+            </a:gdLst>
+            <a:ahLst/>
+            <a:cxnLst>
+              <a:cxn ang="0">
+                <a:pos x="connsiteX0" y="connsiteY0"/>
+              </a:cxn>
+              <a:cxn ang="0">
+                <a:pos x="connsiteX1" y="connsiteY1"/>
+              </a:cxn>
+              <a:cxn ang="0">
+                <a:pos x="connsiteX2" y="connsiteY2"/>
+              </a:cxn>
+            </a:cxnLst>
+            <a:rect l="l" t="t" r="r" b="b"/>
+            <a:pathLst>
+              <a:path w="1733909" h="666165">
+                <a:moveTo>
+                  <a:pt x="0" y="96822"/>
+                </a:moveTo>
+                <a:cubicBezTo>
+                  <a:pt x="127239" y="23497"/>
+                  <a:pt x="254479" y="-49828"/>
+                  <a:pt x="543464" y="45063"/>
+                </a:cubicBezTo>
+                <a:cubicBezTo>
+                  <a:pt x="832449" y="139954"/>
+                  <a:pt x="1283179" y="403059"/>
+                  <a:pt x="1733909" y="666165"/>
+                </a:cubicBezTo>
+              </a:path>
+            </a:pathLst>
+          </a:custGeom>
+          <a:noFill/>
+          <a:ln w="38100">
+            <a:solidFill>
+              <a:schemeClr val="accent2">
+                <a:lumMod val="60000"/>
+                <a:lumOff val="40000"/>
+              </a:schemeClr>
+            </a:solidFill>
+            <a:prstDash val="sysDash"/>
+            <a:headEnd type="none" w="med" len="med"/>
+            <a:tailEnd type="triangle" w="med" len="med"/>
+          </a:ln>
+          <a:effectLst>
+            <a:outerShdw blurRad="50800" dist="38100" dir="2700000" algn="tl" rotWithShape="0">
+              <a:prstClr val="black">
+                <a:alpha val="40000"/>
+              </a:prstClr>
+            </a:outerShdw>
+          </a:effectLst>
+        </p:spPr>
+        <p:style>
+          <a:lnRef idx="2">
+            <a:schemeClr val="accent1">
+              <a:shade val="50000"/>
+            </a:schemeClr>
+          </a:lnRef>
+          <a:fillRef idx="1">
+            <a:schemeClr val="accent1"/>
+          </a:fillRef>
+          <a:effectRef idx="0">
+            <a:schemeClr val="accent1"/>
+          </a:effectRef>
+          <a:fontRef idx="minor">
+            <a:schemeClr val="lt1"/>
+          </a:fontRef>
+        </p:style>
+        <p:txBody>
+          <a:bodyPr rtlCol="0" anchor="ctr"/>
+          <a:lstStyle/>
+          <a:p>
+            <a:pPr algn="ctr"/>
+            <a:endParaRPr lang="en-US"/>
+          </a:p>
+        </p:txBody>
+      </p:sp>
+      <p:sp>
+        <p:nvSpPr>
+          <p:cNvPr id="66" name="TextBox 65"/>
+          <p:cNvSpPr txBox="1"/>
+          <p:nvPr/>
+        </p:nvSpPr>
+        <p:spPr>
+          <a:xfrm>
+            <a:off x="808981" y="693241"/>
+            <a:ext cx="2342548" cy="400110"/>
+          </a:xfrm>
+          <a:prstGeom prst="rect">
+            <a:avLst/>
+          </a:prstGeom>
+          <a:noFill/>
+        </p:spPr>
+        <p:txBody>
+          <a:bodyPr wrap="square" rtlCol="0">
+            <a:spAutoFit/>
+          </a:bodyPr>
+          <a:lstStyle/>
+          <a:p>
+            <a:pPr algn="ctr"/>
+            <a:r>
+              <a:rPr lang="en-US" sz="2000" b="1" dirty="0"/>
+              <a:t>DedupeLibrary</a:t>
+            </a:r>
+            <a:endParaRPr lang="en-US" sz="1600" b="1" dirty="0"/>
+          </a:p>
+        </p:txBody>
+      </p:sp>
+      <p:sp>
+        <p:nvSpPr>
+          <p:cNvPr id="67" name="TextBox 66"/>
+          <p:cNvSpPr txBox="1"/>
+          <p:nvPr/>
+        </p:nvSpPr>
+        <p:spPr>
+          <a:xfrm>
+            <a:off x="4549965" y="698999"/>
+            <a:ext cx="2342548" cy="400110"/>
+          </a:xfrm>
+          <a:prstGeom prst="rect">
+            <a:avLst/>
+          </a:prstGeom>
+          <a:noFill/>
+        </p:spPr>
+        <p:txBody>
+          <a:bodyPr wrap="square" rtlCol="0">
+            <a:spAutoFit/>
+          </a:bodyPr>
+          <a:lstStyle/>
+          <a:p>
+            <a:pPr algn="ctr"/>
+            <a:r>
+              <a:rPr lang="en-US" sz="2000" b="1" dirty="0"/>
+              <a:t>DedupeLibraryXL</a:t>
+            </a:r>
+            <a:endParaRPr lang="en-US" sz="1600" b="1" dirty="0"/>
+          </a:p>
+        </p:txBody>
+      </p:sp>
+      <p:sp>
+        <p:nvSpPr>
+          <p:cNvPr id="68" name="TextBox 67"/>
+          <p:cNvSpPr txBox="1"/>
+          <p:nvPr/>
+        </p:nvSpPr>
+        <p:spPr>
+          <a:xfrm>
+            <a:off x="995942" y="4248517"/>
+            <a:ext cx="2017553" cy="461665"/>
+          </a:xfrm>
+          <a:prstGeom prst="rect">
+            <a:avLst/>
+          </a:prstGeom>
+          <a:noFill/>
+        </p:spPr>
+        <p:txBody>
+          <a:bodyPr wrap="square" rtlCol="0">
+            <a:spAutoFit/>
+          </a:bodyPr>
+          <a:lstStyle/>
+          <a:p>
+            <a:pPr algn="ctr"/>
+            <a:r>
+              <a:rPr lang="en-US" sz="1200" dirty="0"/>
+              <a:t>One object chunk map for all objects and chunks</a:t>
+            </a:r>
+          </a:p>
+        </p:txBody>
+      </p:sp>
+      <p:sp>
+        <p:nvSpPr>
+          <p:cNvPr id="69" name="TextBox 68"/>
+          <p:cNvSpPr txBox="1"/>
+          <p:nvPr/>
+        </p:nvSpPr>
+        <p:spPr>
+          <a:xfrm>
+            <a:off x="4935330" y="4254272"/>
+            <a:ext cx="2017553" cy="461665"/>
+          </a:xfrm>
+          <a:prstGeom prst="rect">
+            <a:avLst/>
+          </a:prstGeom>
+          <a:noFill/>
+        </p:spPr>
+        <p:txBody>
+          <a:bodyPr wrap="square" rtlCol="0">
+            <a:spAutoFit/>
+          </a:bodyPr>
+          <a:lstStyle/>
+          <a:p>
+            <a:pPr algn="ctr"/>
+            <a:r>
+              <a:rPr lang="en-US" sz="1200" dirty="0"/>
+              <a:t>One object chunk map for each container</a:t>
             </a:r>
           </a:p>
         </p:txBody>

</xml_diff>

<commit_message>
Remove XL project, bugfixes after testing
</commit_message>
<xml_diff>
--- a/assets/diagram.pptx
+++ b/assets/diagram.pptx
@@ -241,7 +241,7 @@
           <a:p>
             <a:fld id="{674029AA-DF66-4633-A86F-E8C958DC830D}" type="datetimeFigureOut">
               <a:rPr lang="en-US" smtClean="0"/>
-              <a:t>2/10/2017</a:t>
+              <a:t>7/14/2019</a:t>
             </a:fld>
             <a:endParaRPr lang="en-US"/>
           </a:p>
@@ -409,7 +409,7 @@
           <a:p>
             <a:fld id="{674029AA-DF66-4633-A86F-E8C958DC830D}" type="datetimeFigureOut">
               <a:rPr lang="en-US" smtClean="0"/>
-              <a:t>2/10/2017</a:t>
+              <a:t>7/14/2019</a:t>
             </a:fld>
             <a:endParaRPr lang="en-US"/>
           </a:p>
@@ -587,7 +587,7 @@
           <a:p>
             <a:fld id="{674029AA-DF66-4633-A86F-E8C958DC830D}" type="datetimeFigureOut">
               <a:rPr lang="en-US" smtClean="0"/>
-              <a:t>2/10/2017</a:t>
+              <a:t>7/14/2019</a:t>
             </a:fld>
             <a:endParaRPr lang="en-US"/>
           </a:p>
@@ -755,7 +755,7 @@
           <a:p>
             <a:fld id="{674029AA-DF66-4633-A86F-E8C958DC830D}" type="datetimeFigureOut">
               <a:rPr lang="en-US" smtClean="0"/>
-              <a:t>2/10/2017</a:t>
+              <a:t>7/14/2019</a:t>
             </a:fld>
             <a:endParaRPr lang="en-US"/>
           </a:p>
@@ -1000,7 +1000,7 @@
           <a:p>
             <a:fld id="{674029AA-DF66-4633-A86F-E8C958DC830D}" type="datetimeFigureOut">
               <a:rPr lang="en-US" smtClean="0"/>
-              <a:t>2/10/2017</a:t>
+              <a:t>7/14/2019</a:t>
             </a:fld>
             <a:endParaRPr lang="en-US"/>
           </a:p>
@@ -1229,7 +1229,7 @@
           <a:p>
             <a:fld id="{674029AA-DF66-4633-A86F-E8C958DC830D}" type="datetimeFigureOut">
               <a:rPr lang="en-US" smtClean="0"/>
-              <a:t>2/10/2017</a:t>
+              <a:t>7/14/2019</a:t>
             </a:fld>
             <a:endParaRPr lang="en-US"/>
           </a:p>
@@ -1593,7 +1593,7 @@
           <a:p>
             <a:fld id="{674029AA-DF66-4633-A86F-E8C958DC830D}" type="datetimeFigureOut">
               <a:rPr lang="en-US" smtClean="0"/>
-              <a:t>2/10/2017</a:t>
+              <a:t>7/14/2019</a:t>
             </a:fld>
             <a:endParaRPr lang="en-US"/>
           </a:p>
@@ -1710,7 +1710,7 @@
           <a:p>
             <a:fld id="{674029AA-DF66-4633-A86F-E8C958DC830D}" type="datetimeFigureOut">
               <a:rPr lang="en-US" smtClean="0"/>
-              <a:t>2/10/2017</a:t>
+              <a:t>7/14/2019</a:t>
             </a:fld>
             <a:endParaRPr lang="en-US"/>
           </a:p>
@@ -1805,7 +1805,7 @@
           <a:p>
             <a:fld id="{674029AA-DF66-4633-A86F-E8C958DC830D}" type="datetimeFigureOut">
               <a:rPr lang="en-US" smtClean="0"/>
-              <a:t>2/10/2017</a:t>
+              <a:t>7/14/2019</a:t>
             </a:fld>
             <a:endParaRPr lang="en-US"/>
           </a:p>
@@ -2080,7 +2080,7 @@
           <a:p>
             <a:fld id="{674029AA-DF66-4633-A86F-E8C958DC830D}" type="datetimeFigureOut">
               <a:rPr lang="en-US" smtClean="0"/>
-              <a:t>2/10/2017</a:t>
+              <a:t>7/14/2019</a:t>
             </a:fld>
             <a:endParaRPr lang="en-US"/>
           </a:p>
@@ -2332,7 +2332,7 @@
           <a:p>
             <a:fld id="{674029AA-DF66-4633-A86F-E8C958DC830D}" type="datetimeFigureOut">
               <a:rPr lang="en-US" smtClean="0"/>
-              <a:t>2/10/2017</a:t>
+              <a:t>7/14/2019</a:t>
             </a:fld>
             <a:endParaRPr lang="en-US"/>
           </a:p>
@@ -2543,7 +2543,7 @@
           <a:p>
             <a:fld id="{674029AA-DF66-4633-A86F-E8C958DC830D}" type="datetimeFigureOut">
               <a:rPr lang="en-US" smtClean="0"/>
-              <a:t>2/10/2017</a:t>
+              <a:t>7/14/2019</a:t>
             </a:fld>
             <a:endParaRPr lang="en-US"/>
           </a:p>

</xml_diff>